<commit_message>
update iot core slides
</commit_message>
<xml_diff>
--- a/IoT analytics.pptx
+++ b/IoT analytics.pptx
@@ -6,10 +6,13 @@
   </p:sldMasterIdLst>
   <p:sldIdLst>
     <p:sldId id="256" r:id="rId2"/>
-    <p:sldId id="259" r:id="rId3"/>
-    <p:sldId id="263" r:id="rId4"/>
-    <p:sldId id="260" r:id="rId5"/>
-    <p:sldId id="261" r:id="rId6"/>
+    <p:sldId id="266" r:id="rId3"/>
+    <p:sldId id="267" r:id="rId4"/>
+    <p:sldId id="259" r:id="rId5"/>
+    <p:sldId id="264" r:id="rId6"/>
+    <p:sldId id="265" r:id="rId7"/>
+    <p:sldId id="260" r:id="rId8"/>
+    <p:sldId id="261" r:id="rId9"/>
   </p:sldIdLst>
   <p:sldSz cx="12192000" cy="6858000"/>
   <p:notesSz cx="6858000" cy="9144000"/>
@@ -247,7 +250,7 @@
           <a:p>
             <a:fld id="{3BC1C1F4-6ABF-4EFA-90D5-B3F216C913A9}" type="datetimeFigureOut">
               <a:rPr lang="en-US" smtClean="0"/>
-              <a:t>10/19/2020</a:t>
+              <a:t>10/20/2020</a:t>
             </a:fld>
             <a:endParaRPr lang="en-US"/>
           </a:p>
@@ -417,7 +420,7 @@
           <a:p>
             <a:fld id="{3BC1C1F4-6ABF-4EFA-90D5-B3F216C913A9}" type="datetimeFigureOut">
               <a:rPr lang="en-US" smtClean="0"/>
-              <a:t>10/19/2020</a:t>
+              <a:t>10/20/2020</a:t>
             </a:fld>
             <a:endParaRPr lang="en-US"/>
           </a:p>
@@ -597,7 +600,7 @@
           <a:p>
             <a:fld id="{3BC1C1F4-6ABF-4EFA-90D5-B3F216C913A9}" type="datetimeFigureOut">
               <a:rPr lang="en-US" smtClean="0"/>
-              <a:t>10/19/2020</a:t>
+              <a:t>10/20/2020</a:t>
             </a:fld>
             <a:endParaRPr lang="en-US"/>
           </a:p>
@@ -767,7 +770,7 @@
           <a:p>
             <a:fld id="{3BC1C1F4-6ABF-4EFA-90D5-B3F216C913A9}" type="datetimeFigureOut">
               <a:rPr lang="en-US" smtClean="0"/>
-              <a:t>10/19/2020</a:t>
+              <a:t>10/20/2020</a:t>
             </a:fld>
             <a:endParaRPr lang="en-US"/>
           </a:p>
@@ -1013,7 +1016,7 @@
           <a:p>
             <a:fld id="{3BC1C1F4-6ABF-4EFA-90D5-B3F216C913A9}" type="datetimeFigureOut">
               <a:rPr lang="en-US" smtClean="0"/>
-              <a:t>10/19/2020</a:t>
+              <a:t>10/20/2020</a:t>
             </a:fld>
             <a:endParaRPr lang="en-US"/>
           </a:p>
@@ -1245,7 +1248,7 @@
           <a:p>
             <a:fld id="{3BC1C1F4-6ABF-4EFA-90D5-B3F216C913A9}" type="datetimeFigureOut">
               <a:rPr lang="en-US" smtClean="0"/>
-              <a:t>10/19/2020</a:t>
+              <a:t>10/20/2020</a:t>
             </a:fld>
             <a:endParaRPr lang="en-US"/>
           </a:p>
@@ -1612,7 +1615,7 @@
           <a:p>
             <a:fld id="{3BC1C1F4-6ABF-4EFA-90D5-B3F216C913A9}" type="datetimeFigureOut">
               <a:rPr lang="en-US" smtClean="0"/>
-              <a:t>10/19/2020</a:t>
+              <a:t>10/20/2020</a:t>
             </a:fld>
             <a:endParaRPr lang="en-US"/>
           </a:p>
@@ -1730,7 +1733,7 @@
           <a:p>
             <a:fld id="{3BC1C1F4-6ABF-4EFA-90D5-B3F216C913A9}" type="datetimeFigureOut">
               <a:rPr lang="en-US" smtClean="0"/>
-              <a:t>10/19/2020</a:t>
+              <a:t>10/20/2020</a:t>
             </a:fld>
             <a:endParaRPr lang="en-US"/>
           </a:p>
@@ -1825,7 +1828,7 @@
           <a:p>
             <a:fld id="{3BC1C1F4-6ABF-4EFA-90D5-B3F216C913A9}" type="datetimeFigureOut">
               <a:rPr lang="en-US" smtClean="0"/>
-              <a:t>10/19/2020</a:t>
+              <a:t>10/20/2020</a:t>
             </a:fld>
             <a:endParaRPr lang="en-US"/>
           </a:p>
@@ -2102,7 +2105,7 @@
           <a:p>
             <a:fld id="{3BC1C1F4-6ABF-4EFA-90D5-B3F216C913A9}" type="datetimeFigureOut">
               <a:rPr lang="en-US" smtClean="0"/>
-              <a:t>10/19/2020</a:t>
+              <a:t>10/20/2020</a:t>
             </a:fld>
             <a:endParaRPr lang="en-US"/>
           </a:p>
@@ -2355,7 +2358,7 @@
           <a:p>
             <a:fld id="{3BC1C1F4-6ABF-4EFA-90D5-B3F216C913A9}" type="datetimeFigureOut">
               <a:rPr lang="en-US" smtClean="0"/>
-              <a:t>10/19/2020</a:t>
+              <a:t>10/20/2020</a:t>
             </a:fld>
             <a:endParaRPr lang="en-US"/>
           </a:p>
@@ -2568,7 +2571,7 @@
           <a:p>
             <a:fld id="{3BC1C1F4-6ABF-4EFA-90D5-B3F216C913A9}" type="datetimeFigureOut">
               <a:rPr lang="en-US" smtClean="0"/>
-              <a:t>10/19/2020</a:t>
+              <a:t>10/20/2020</a:t>
             </a:fld>
             <a:endParaRPr lang="en-US"/>
           </a:p>
@@ -2990,7 +2993,15 @@
           <a:p>
             <a:r>
               <a:rPr lang="en-US" smtClean="0"/>
-              <a:t>AWS analytics pipeline</a:t>
+              <a:t>AWS </a:t>
+            </a:r>
+            <a:r>
+              <a:rPr lang="en-US" smtClean="0"/>
+              <a:t>IoT </a:t>
+            </a:r>
+            <a:r>
+              <a:rPr lang="en-US" smtClean="0"/>
+              <a:t>pipeline</a:t>
             </a:r>
             <a:endParaRPr lang="en-US"/>
           </a:p>
@@ -3042,12 +3053,347 @@
           <a:lstStyle/>
           <a:p>
             <a:r>
+              <a:rPr lang="en-US" smtClean="0"/>
+              <a:t>AWS IoT core platform</a:t>
+            </a:r>
+            <a:endParaRPr lang="en-US"/>
+          </a:p>
+        </p:txBody>
+      </p:sp>
+      <p:pic>
+        <p:nvPicPr>
+          <p:cNvPr id="4" name="Picture 3"/>
+          <p:cNvPicPr>
+            <a:picLocks noChangeAspect="1"/>
+          </p:cNvPicPr>
+          <p:nvPr/>
+        </p:nvPicPr>
+        <p:blipFill>
+          <a:blip r:embed="rId2"/>
+          <a:stretch>
+            <a:fillRect/>
+          </a:stretch>
+        </p:blipFill>
+        <p:spPr>
+          <a:xfrm>
+            <a:off x="184638" y="1620684"/>
+            <a:ext cx="6796454" cy="5233332"/>
+          </a:xfrm>
+          <a:prstGeom prst="rect">
+            <a:avLst/>
+          </a:prstGeom>
+        </p:spPr>
+      </p:pic>
+      <p:sp>
+        <p:nvSpPr>
+          <p:cNvPr id="5" name="Rectangle 4"/>
+          <p:cNvSpPr/>
+          <p:nvPr/>
+        </p:nvSpPr>
+        <p:spPr>
+          <a:xfrm>
+            <a:off x="7127630" y="1620684"/>
+            <a:ext cx="4706815" cy="646331"/>
+          </a:xfrm>
+          <a:prstGeom prst="rect">
+            <a:avLst/>
+          </a:prstGeom>
+        </p:spPr>
+        <p:txBody>
+          <a:bodyPr wrap="square">
+            <a:spAutoFit/>
+          </a:bodyPr>
+          <a:lstStyle/>
+          <a:p>
+            <a:r>
+              <a:rPr lang="en-US"/>
+              <a:t>Gateway currently supports MQTT</a:t>
+            </a:r>
+            <a:r>
+              <a:rPr lang="en-US"/>
+              <a:t>, </a:t>
+            </a:r>
+            <a:endParaRPr lang="en-US" smtClean="0"/>
+          </a:p>
+          <a:p>
+            <a:r>
+              <a:rPr lang="en-US" smtClean="0"/>
+              <a:t>WebSockets</a:t>
+            </a:r>
+            <a:r>
+              <a:rPr lang="en-US"/>
+              <a:t>, and HTTP 1.1 protocols</a:t>
+            </a:r>
+          </a:p>
+        </p:txBody>
+      </p:sp>
+      <p:sp>
+        <p:nvSpPr>
+          <p:cNvPr id="6" name="Rectangle 5"/>
+          <p:cNvSpPr/>
+          <p:nvPr/>
+        </p:nvSpPr>
+        <p:spPr>
+          <a:xfrm>
+            <a:off x="7127630" y="2599244"/>
+            <a:ext cx="4941277" cy="923330"/>
+          </a:xfrm>
+          <a:prstGeom prst="rect">
+            <a:avLst/>
+          </a:prstGeom>
+        </p:spPr>
+        <p:txBody>
+          <a:bodyPr wrap="square">
+            <a:spAutoFit/>
+          </a:bodyPr>
+          <a:lstStyle/>
+          <a:p>
+            <a:r>
+              <a:rPr lang="en-US"/>
+              <a:t>Once an MQTT message is received from an IoT device (a thing), we use </a:t>
+            </a:r>
+            <a:r>
+              <a:rPr lang="en-US">
+                <a:hlinkClick r:id="rId3"/>
+              </a:rPr>
+              <a:t>AWS IoT Rules</a:t>
+            </a:r>
+            <a:r>
+              <a:rPr lang="en-US"/>
+              <a:t> to send message data to an </a:t>
+            </a:r>
+            <a:r>
+              <a:rPr lang="en-US">
+                <a:hlinkClick r:id="rId4"/>
+              </a:rPr>
+              <a:t>AWS IoT Analytics Channel</a:t>
+            </a:r>
+            <a:r>
+              <a:rPr lang="en-US"/>
+              <a:t>.</a:t>
+            </a:r>
+          </a:p>
+        </p:txBody>
+      </p:sp>
+    </p:spTree>
+    <p:extLst>
+      <p:ext uri="{BB962C8B-B14F-4D97-AF65-F5344CB8AC3E}">
+        <p14:creationId xmlns:p14="http://schemas.microsoft.com/office/powerpoint/2010/main" val="547988742"/>
+      </p:ext>
+    </p:extLst>
+  </p:cSld>
+  <p:clrMapOvr>
+    <a:masterClrMapping/>
+  </p:clrMapOvr>
+</p:sld>
+</file>
+
+<file path=ppt/slides/slide3.xml><?xml version="1.0" encoding="utf-8"?>
+<p:sld xmlns:a="http://schemas.openxmlformats.org/drawingml/2006/main" xmlns:r="http://schemas.openxmlformats.org/officeDocument/2006/relationships" xmlns:p="http://schemas.openxmlformats.org/presentationml/2006/main">
+  <p:cSld>
+    <p:spTree>
+      <p:nvGrpSpPr>
+        <p:cNvPr id="1" name=""/>
+        <p:cNvGrpSpPr/>
+        <p:nvPr/>
+      </p:nvGrpSpPr>
+      <p:grpSpPr>
+        <a:xfrm>
+          <a:off x="0" y="0"/>
+          <a:ext cx="0" cy="0"/>
+          <a:chOff x="0" y="0"/>
+          <a:chExt cx="0" cy="0"/>
+        </a:xfrm>
+      </p:grpSpPr>
+      <p:sp>
+        <p:nvSpPr>
+          <p:cNvPr id="2" name="Title 1"/>
+          <p:cNvSpPr>
+            <a:spLocks noGrp="1"/>
+          </p:cNvSpPr>
+          <p:nvPr>
+            <p:ph type="title"/>
+          </p:nvPr>
+        </p:nvSpPr>
+        <p:spPr/>
+        <p:txBody>
+          <a:bodyPr/>
+          <a:lstStyle/>
+          <a:p>
+            <a:r>
+              <a:rPr lang="en-US" smtClean="0"/>
+              <a:t>AWS CloudFormation</a:t>
+            </a:r>
+            <a:endParaRPr lang="en-US"/>
+          </a:p>
+        </p:txBody>
+      </p:sp>
+      <p:sp>
+        <p:nvSpPr>
+          <p:cNvPr id="3" name="Content Placeholder 2"/>
+          <p:cNvSpPr>
+            <a:spLocks noGrp="1"/>
+          </p:cNvSpPr>
+          <p:nvPr>
+            <p:ph idx="1"/>
+          </p:nvPr>
+        </p:nvSpPr>
+        <p:spPr/>
+        <p:txBody>
+          <a:bodyPr>
+            <a:normAutofit/>
+          </a:bodyPr>
+          <a:lstStyle/>
+          <a:p>
+            <a:r>
+              <a:rPr lang="en-US"/>
+              <a:t>Use the CloudFormation template, iot-analytics.yaml, to create an IoT Analytics stack containing (17) resources, including the following.</a:t>
+            </a:r>
+          </a:p>
+          <a:p>
+            <a:pPr lvl="1"/>
+            <a:r>
+              <a:rPr lang="en-US"/>
+              <a:t>(3) AWS IoT Things</a:t>
+            </a:r>
+          </a:p>
+          <a:p>
+            <a:pPr lvl="1"/>
+            <a:r>
+              <a:rPr lang="en-US"/>
+              <a:t>(1) AWS IoT Core Topic Rule</a:t>
+            </a:r>
+          </a:p>
+          <a:p>
+            <a:pPr lvl="1"/>
+            <a:r>
+              <a:rPr lang="en-US"/>
+              <a:t>(1) AWS IoT Analytics Channel, Pipeline, Data store, and Data set</a:t>
+            </a:r>
+          </a:p>
+          <a:p>
+            <a:pPr lvl="1"/>
+            <a:r>
+              <a:rPr lang="en-US"/>
+              <a:t>(1) AWS Lambda and Lambda Permission</a:t>
+            </a:r>
+          </a:p>
+          <a:p>
+            <a:pPr lvl="1"/>
+            <a:r>
+              <a:rPr lang="en-US"/>
+              <a:t>(1) Amazon S3 Bucket</a:t>
+            </a:r>
+          </a:p>
+          <a:p>
+            <a:pPr lvl="1"/>
+            <a:r>
+              <a:rPr lang="en-US"/>
+              <a:t>(1) Amazon SageMaker Notebook Instance</a:t>
+            </a:r>
+          </a:p>
+          <a:p>
+            <a:pPr lvl="1"/>
+            <a:r>
+              <a:rPr lang="en-US"/>
+              <a:t>(5) AWS IAM Roles</a:t>
+            </a:r>
+          </a:p>
+        </p:txBody>
+      </p:sp>
+      <p:sp>
+        <p:nvSpPr>
+          <p:cNvPr id="4" name="Rectangle 3"/>
+          <p:cNvSpPr/>
+          <p:nvPr/>
+        </p:nvSpPr>
+        <p:spPr>
+          <a:xfrm>
+            <a:off x="973015" y="5807631"/>
+            <a:ext cx="10087708" cy="369332"/>
+          </a:xfrm>
+          <a:prstGeom prst="rect">
+            <a:avLst/>
+          </a:prstGeom>
+        </p:spPr>
+        <p:txBody>
+          <a:bodyPr wrap="square">
+            <a:spAutoFit/>
+          </a:bodyPr>
+          <a:lstStyle/>
+          <a:p>
+            <a:r>
+              <a:rPr lang="en-US" smtClean="0">
+                <a:hlinkClick r:id="rId2"/>
+              </a:rPr>
+              <a:t>https</a:t>
+            </a:r>
+            <a:r>
+              <a:rPr lang="en-US">
+                <a:hlinkClick r:id="rId2"/>
+              </a:rPr>
+              <a:t>://towardsdatascience.com/getting-started-with-iot-analytics-on-aws-5f2093bcf704</a:t>
+            </a:r>
+            <a:endParaRPr lang="en-US"/>
+          </a:p>
+        </p:txBody>
+      </p:sp>
+    </p:spTree>
+    <p:extLst>
+      <p:ext uri="{BB962C8B-B14F-4D97-AF65-F5344CB8AC3E}">
+        <p14:creationId xmlns:p14="http://schemas.microsoft.com/office/powerpoint/2010/main" val="3035742588"/>
+      </p:ext>
+    </p:extLst>
+  </p:cSld>
+  <p:clrMapOvr>
+    <a:masterClrMapping/>
+  </p:clrMapOvr>
+</p:sld>
+</file>
+
+<file path=ppt/slides/slide4.xml><?xml version="1.0" encoding="utf-8"?>
+<p:sld xmlns:a="http://schemas.openxmlformats.org/drawingml/2006/main" xmlns:r="http://schemas.openxmlformats.org/officeDocument/2006/relationships" xmlns:p="http://schemas.openxmlformats.org/presentationml/2006/main">
+  <p:cSld>
+    <p:spTree>
+      <p:nvGrpSpPr>
+        <p:cNvPr id="1" name=""/>
+        <p:cNvGrpSpPr/>
+        <p:nvPr/>
+      </p:nvGrpSpPr>
+      <p:grpSpPr>
+        <a:xfrm>
+          <a:off x="0" y="0"/>
+          <a:ext cx="0" cy="0"/>
+          <a:chOff x="0" y="0"/>
+          <a:chExt cx="0" cy="0"/>
+        </a:xfrm>
+      </p:grpSpPr>
+      <p:sp>
+        <p:nvSpPr>
+          <p:cNvPr id="2" name="Title 1"/>
+          <p:cNvSpPr>
+            <a:spLocks noGrp="1"/>
+          </p:cNvSpPr>
+          <p:nvPr>
+            <p:ph type="title"/>
+          </p:nvPr>
+        </p:nvSpPr>
+        <p:spPr/>
+        <p:txBody>
+          <a:bodyPr/>
+          <a:lstStyle/>
+          <a:p>
+            <a:r>
               <a:rPr lang="en-US"/>
               <a:t>AWS </a:t>
             </a:r>
             <a:r>
               <a:rPr lang="en-US" smtClean="0"/>
-              <a:t>Predictive maintenance</a:t>
+              <a:t>Predictive </a:t>
+            </a:r>
+            <a:r>
+              <a:rPr lang="en-US" smtClean="0"/>
+              <a:t>maintenance architecture</a:t>
             </a:r>
             <a:endParaRPr lang="en-US"/>
           </a:p>
@@ -3090,7 +3436,7 @@
 </p:sld>
 </file>
 
-<file path=ppt/slides/slide3.xml><?xml version="1.0" encoding="utf-8"?>
+<file path=ppt/slides/slide5.xml><?xml version="1.0" encoding="utf-8"?>
 <p:sld xmlns:a="http://schemas.openxmlformats.org/drawingml/2006/main" xmlns:r="http://schemas.openxmlformats.org/officeDocument/2006/relationships" xmlns:p="http://schemas.openxmlformats.org/presentationml/2006/main">
   <p:cSld>
     <p:spTree>
@@ -3123,36 +3469,112 @@
           <a:lstStyle/>
           <a:p>
             <a:r>
-              <a:rPr lang="en-US" smtClean="0"/>
+              <a:rPr lang="en-US"/>
+              <a:t>AWS Predictive maintenance architecture</a:t>
+            </a:r>
+          </a:p>
+        </p:txBody>
+      </p:sp>
+      <p:sp>
+        <p:nvSpPr>
+          <p:cNvPr id="3" name="Content Placeholder 2"/>
+          <p:cNvSpPr>
+            <a:spLocks noGrp="1"/>
+          </p:cNvSpPr>
+          <p:nvPr>
+            <p:ph idx="1"/>
+          </p:nvPr>
+        </p:nvSpPr>
+        <p:spPr/>
+        <p:txBody>
+          <a:bodyPr>
+            <a:normAutofit fontScale="92500" lnSpcReduction="20000"/>
+          </a:bodyPr>
+          <a:lstStyle/>
+          <a:p>
+            <a:r>
+              <a:rPr lang="en-US"/>
+              <a:t>This solution includes an </a:t>
+            </a:r>
+            <a:r>
+              <a:rPr lang="en-US">
+                <a:hlinkClick r:id="rId2"/>
+              </a:rPr>
+              <a:t>AWS CloudFormation</a:t>
+            </a:r>
+            <a:r>
+              <a:rPr lang="en-US"/>
+              <a:t> template that deploys an example dataset of a </a:t>
+            </a:r>
+            <a:r>
+              <a:rPr lang="en-US">
+                <a:hlinkClick r:id="rId3"/>
+              </a:rPr>
+              <a:t>turbofan degradation simulation</a:t>
+            </a:r>
+            <a:r>
+              <a:rPr lang="en-US"/>
+              <a:t> contained in an </a:t>
+            </a:r>
+            <a:r>
+              <a:rPr lang="en-US">
+                <a:hlinkClick r:id="rId4"/>
+              </a:rPr>
+              <a:t>Amazon Simple Storage Service</a:t>
+            </a:r>
+            <a:r>
+              <a:rPr lang="en-US"/>
+              <a:t> (Amazon S3) bucket and an </a:t>
+            </a:r>
+            <a:r>
+              <a:rPr lang="en-US">
+                <a:hlinkClick r:id="rId5"/>
+              </a:rPr>
               <a:t>Amazon SageMaker</a:t>
             </a:r>
-            <a:endParaRPr lang="en-US"/>
-          </a:p>
-        </p:txBody>
-      </p:sp>
-      <p:sp>
-        <p:nvSpPr>
-          <p:cNvPr id="3" name="Content Placeholder 2"/>
-          <p:cNvSpPr>
-            <a:spLocks noGrp="1"/>
-          </p:cNvSpPr>
-          <p:nvPr>
-            <p:ph idx="1"/>
-          </p:nvPr>
-        </p:nvSpPr>
-        <p:spPr/>
-        <p:txBody>
-          <a:bodyPr/>
-          <a:lstStyle/>
-          <a:p>
-            <a:endParaRPr lang="en-US"/>
+            <a:r>
+              <a:rPr lang="en-US"/>
+              <a:t> endpoint with an ML model that will be trained on the dataset to predict remaining useful life (RUL).</a:t>
+            </a:r>
+          </a:p>
+          <a:p>
+            <a:r>
+              <a:rPr lang="en-US"/>
+              <a:t>The solution uses a SageMaker notebook instance to orchestrate the model, and a SageMaker training instance to perform the training. The training code and trained model are stored in the solution's Amazon S3 bucket.</a:t>
+            </a:r>
+          </a:p>
+          <a:p>
+            <a:r>
+              <a:rPr lang="en-US"/>
+              <a:t>The solution also deploys an </a:t>
+            </a:r>
+            <a:r>
+              <a:rPr lang="en-US">
+                <a:hlinkClick r:id="rId6"/>
+              </a:rPr>
+              <a:t>Amazon CloudWatch Events</a:t>
+            </a:r>
+            <a:r>
+              <a:rPr lang="en-US"/>
+              <a:t> rule that is configured to run once per day. The rule is configured to trigger an </a:t>
+            </a:r>
+            <a:r>
+              <a:rPr lang="en-US">
+                <a:hlinkClick r:id="rId7"/>
+              </a:rPr>
+              <a:t>AWS Lambda</a:t>
+            </a:r>
+            <a:r>
+              <a:rPr lang="en-US"/>
+              <a:t> function that creates an Amazon SageMaker batch transform job that uses the trained model to predict RUL from the example dataset.</a:t>
+            </a:r>
           </a:p>
         </p:txBody>
       </p:sp>
     </p:spTree>
     <p:extLst>
       <p:ext uri="{BB962C8B-B14F-4D97-AF65-F5344CB8AC3E}">
-        <p14:creationId xmlns:p14="http://schemas.microsoft.com/office/powerpoint/2010/main" val="745708400"/>
+        <p14:creationId xmlns:p14="http://schemas.microsoft.com/office/powerpoint/2010/main" val="2322710326"/>
       </p:ext>
     </p:extLst>
   </p:cSld>
@@ -3162,7 +3584,7 @@
 </p:sld>
 </file>
 
-<file path=ppt/slides/slide4.xml><?xml version="1.0" encoding="utf-8"?>
+<file path=ppt/slides/slide6.xml><?xml version="1.0" encoding="utf-8"?>
 <p:sld xmlns:a="http://schemas.openxmlformats.org/drawingml/2006/main" xmlns:r="http://schemas.openxmlformats.org/officeDocument/2006/relationships" xmlns:p="http://schemas.openxmlformats.org/presentationml/2006/main">
   <p:cSld>
     <p:spTree>
@@ -3195,12 +3617,173 @@
           <a:lstStyle/>
           <a:p>
             <a:r>
+              <a:rPr lang="en-US" smtClean="0"/>
+              <a:t>Steps to deploy </a:t>
+            </a:r>
+            <a:endParaRPr lang="en-US"/>
+          </a:p>
+        </p:txBody>
+      </p:sp>
+      <p:sp>
+        <p:nvSpPr>
+          <p:cNvPr id="3" name="Content Placeholder 2"/>
+          <p:cNvSpPr>
+            <a:spLocks noGrp="1"/>
+          </p:cNvSpPr>
+          <p:nvPr>
+            <p:ph idx="1"/>
+          </p:nvPr>
+        </p:nvSpPr>
+        <p:spPr/>
+        <p:txBody>
+          <a:bodyPr>
+            <a:normAutofit fontScale="92500" lnSpcReduction="10000"/>
+          </a:bodyPr>
+          <a:lstStyle/>
+          <a:p>
+            <a:r>
+              <a:rPr lang="en-US" u="sng">
+                <a:hlinkClick r:id="rId2"/>
+              </a:rPr>
+              <a:t>Step 1. Launch the Stack</a:t>
+            </a:r>
+            <a:endParaRPr lang="en-US"/>
+          </a:p>
+          <a:p>
+            <a:pPr lvl="1"/>
+            <a:r>
               <a:rPr lang="en-US"/>
-              <a:t>Amazon </a:t>
-            </a:r>
+              <a:t>Launch the AWS CloudFormation template into your AWS account.</a:t>
+            </a:r>
+          </a:p>
+          <a:p>
+            <a:pPr lvl="1"/>
             <a:r>
               <a:rPr lang="en-US"/>
-              <a:t>CloudWatch </a:t>
+              <a:t>Enter values for the required parameters: </a:t>
+            </a:r>
+            <a:r>
+              <a:rPr lang="en-US" b="1"/>
+              <a:t>Stack Name</a:t>
+            </a:r>
+            <a:r>
+              <a:rPr lang="en-US"/>
+              <a:t>, </a:t>
+            </a:r>
+            <a:r>
+              <a:rPr lang="en-US" b="1"/>
+              <a:t>Model and Data Bucket Name</a:t>
+            </a:r>
+            <a:endParaRPr lang="en-US"/>
+          </a:p>
+          <a:p>
+            <a:pPr lvl="1"/>
+            <a:r>
+              <a:rPr lang="en-US"/>
+              <a:t>Review the other template parameters, and adjust if necessary.</a:t>
+            </a:r>
+          </a:p>
+          <a:p>
+            <a:r>
+              <a:rPr lang="en-US">
+                <a:hlinkClick r:id="rId3"/>
+              </a:rPr>
+              <a:t>Step 2. Run the Notebook</a:t>
+            </a:r>
+            <a:endParaRPr lang="en-US"/>
+          </a:p>
+          <a:p>
+            <a:pPr lvl="1"/>
+            <a:r>
+              <a:rPr lang="en-US"/>
+              <a:t>Run the Jupyter Notebook to train the ML model.</a:t>
+            </a:r>
+          </a:p>
+          <a:p>
+            <a:r>
+              <a:rPr lang="en-US">
+                <a:hlinkClick r:id="rId4"/>
+              </a:rPr>
+              <a:t>Step 3. Enable the CloudWatch Events Rule</a:t>
+            </a:r>
+            <a:endParaRPr lang="en-US"/>
+          </a:p>
+          <a:p>
+            <a:pPr lvl="1"/>
+            <a:r>
+              <a:rPr lang="en-US"/>
+              <a:t>Enable the Amazon CloudWatch Events rule.</a:t>
+            </a:r>
+          </a:p>
+          <a:p>
+            <a:r>
+              <a:rPr lang="en-US">
+                <a:hlinkClick r:id="rId5"/>
+              </a:rPr>
+              <a:t>Step 4. Verify the Lambda Function Is Processing Data</a:t>
+            </a:r>
+            <a:endParaRPr lang="en-US"/>
+          </a:p>
+          <a:p>
+            <a:pPr lvl="1"/>
+            <a:r>
+              <a:rPr lang="en-US"/>
+              <a:t>Verify that the AWS Lambda function is processing data.</a:t>
+            </a:r>
+          </a:p>
+          <a:p>
+            <a:endParaRPr lang="en-US"/>
+          </a:p>
+        </p:txBody>
+      </p:sp>
+    </p:spTree>
+    <p:extLst>
+      <p:ext uri="{BB962C8B-B14F-4D97-AF65-F5344CB8AC3E}">
+        <p14:creationId xmlns:p14="http://schemas.microsoft.com/office/powerpoint/2010/main" val="3570463678"/>
+      </p:ext>
+    </p:extLst>
+  </p:cSld>
+  <p:clrMapOvr>
+    <a:masterClrMapping/>
+  </p:clrMapOvr>
+</p:sld>
+</file>
+
+<file path=ppt/slides/slide7.xml><?xml version="1.0" encoding="utf-8"?>
+<p:sld xmlns:a="http://schemas.openxmlformats.org/drawingml/2006/main" xmlns:r="http://schemas.openxmlformats.org/officeDocument/2006/relationships" xmlns:p="http://schemas.openxmlformats.org/presentationml/2006/main">
+  <p:cSld>
+    <p:spTree>
+      <p:nvGrpSpPr>
+        <p:cNvPr id="1" name=""/>
+        <p:cNvGrpSpPr/>
+        <p:nvPr/>
+      </p:nvGrpSpPr>
+      <p:grpSpPr>
+        <a:xfrm>
+          <a:off x="0" y="0"/>
+          <a:ext cx="0" cy="0"/>
+          <a:chOff x="0" y="0"/>
+          <a:chExt cx="0" cy="0"/>
+        </a:xfrm>
+      </p:grpSpPr>
+      <p:sp>
+        <p:nvSpPr>
+          <p:cNvPr id="2" name="Title 1"/>
+          <p:cNvSpPr>
+            <a:spLocks noGrp="1"/>
+          </p:cNvSpPr>
+          <p:nvPr>
+            <p:ph type="title"/>
+          </p:nvPr>
+        </p:nvSpPr>
+        <p:spPr/>
+        <p:txBody>
+          <a:bodyPr/>
+          <a:lstStyle/>
+          <a:p>
+            <a:r>
+              <a:rPr lang="en-US"/>
+              <a:t>Amazon CloudWatch </a:t>
             </a:r>
             <a:r>
               <a:rPr lang="en-US" smtClean="0"/>
@@ -3297,7 +3880,7 @@
 </p:sld>
 </file>
 
-<file path=ppt/slides/slide5.xml><?xml version="1.0" encoding="utf-8"?>
+<file path=ppt/slides/slide8.xml><?xml version="1.0" encoding="utf-8"?>
 <p:sld xmlns:a="http://schemas.openxmlformats.org/drawingml/2006/main" xmlns:r="http://schemas.openxmlformats.org/officeDocument/2006/relationships" xmlns:p="http://schemas.openxmlformats.org/presentationml/2006/main">
   <p:cSld>
     <p:spTree>

</xml_diff>

<commit_message>
remove two last slides
</commit_message>
<xml_diff>
--- a/IoT analytics.pptx
+++ b/IoT analytics.pptx
@@ -7,18 +7,18 @@
   <p:sldIdLst>
     <p:sldId id="256" r:id="rId2"/>
     <p:sldId id="266" r:id="rId3"/>
-    <p:sldId id="267" r:id="rId4"/>
-    <p:sldId id="268" r:id="rId5"/>
-    <p:sldId id="269" r:id="rId6"/>
-    <p:sldId id="270" r:id="rId7"/>
-    <p:sldId id="271" r:id="rId8"/>
-    <p:sldId id="272" r:id="rId9"/>
-    <p:sldId id="273" r:id="rId10"/>
-    <p:sldId id="259" r:id="rId11"/>
-    <p:sldId id="264" r:id="rId12"/>
-    <p:sldId id="265" r:id="rId13"/>
-    <p:sldId id="260" r:id="rId14"/>
-    <p:sldId id="261" r:id="rId15"/>
+    <p:sldId id="276" r:id="rId4"/>
+    <p:sldId id="267" r:id="rId5"/>
+    <p:sldId id="268" r:id="rId6"/>
+    <p:sldId id="269" r:id="rId7"/>
+    <p:sldId id="270" r:id="rId8"/>
+    <p:sldId id="271" r:id="rId9"/>
+    <p:sldId id="272" r:id="rId10"/>
+    <p:sldId id="273" r:id="rId11"/>
+    <p:sldId id="274" r:id="rId12"/>
+    <p:sldId id="259" r:id="rId13"/>
+    <p:sldId id="264" r:id="rId14"/>
+    <p:sldId id="265" r:id="rId15"/>
   </p:sldIdLst>
   <p:sldSz cx="12192000" cy="6858000"/>
   <p:notesSz cx="6858000" cy="9144000"/>
@@ -256,7 +256,7 @@
           <a:p>
             <a:fld id="{3BC1C1F4-6ABF-4EFA-90D5-B3F216C913A9}" type="datetimeFigureOut">
               <a:rPr lang="en-US" smtClean="0"/>
-              <a:t>10/22/2020</a:t>
+              <a:t>10/23/2020</a:t>
             </a:fld>
             <a:endParaRPr lang="en-US"/>
           </a:p>
@@ -426,7 +426,7 @@
           <a:p>
             <a:fld id="{3BC1C1F4-6ABF-4EFA-90D5-B3F216C913A9}" type="datetimeFigureOut">
               <a:rPr lang="en-US" smtClean="0"/>
-              <a:t>10/22/2020</a:t>
+              <a:t>10/23/2020</a:t>
             </a:fld>
             <a:endParaRPr lang="en-US"/>
           </a:p>
@@ -606,7 +606,7 @@
           <a:p>
             <a:fld id="{3BC1C1F4-6ABF-4EFA-90D5-B3F216C913A9}" type="datetimeFigureOut">
               <a:rPr lang="en-US" smtClean="0"/>
-              <a:t>10/22/2020</a:t>
+              <a:t>10/23/2020</a:t>
             </a:fld>
             <a:endParaRPr lang="en-US"/>
           </a:p>
@@ -776,7 +776,7 @@
           <a:p>
             <a:fld id="{3BC1C1F4-6ABF-4EFA-90D5-B3F216C913A9}" type="datetimeFigureOut">
               <a:rPr lang="en-US" smtClean="0"/>
-              <a:t>10/22/2020</a:t>
+              <a:t>10/23/2020</a:t>
             </a:fld>
             <a:endParaRPr lang="en-US"/>
           </a:p>
@@ -1022,7 +1022,7 @@
           <a:p>
             <a:fld id="{3BC1C1F4-6ABF-4EFA-90D5-B3F216C913A9}" type="datetimeFigureOut">
               <a:rPr lang="en-US" smtClean="0"/>
-              <a:t>10/22/2020</a:t>
+              <a:t>10/23/2020</a:t>
             </a:fld>
             <a:endParaRPr lang="en-US"/>
           </a:p>
@@ -1254,7 +1254,7 @@
           <a:p>
             <a:fld id="{3BC1C1F4-6ABF-4EFA-90D5-B3F216C913A9}" type="datetimeFigureOut">
               <a:rPr lang="en-US" smtClean="0"/>
-              <a:t>10/22/2020</a:t>
+              <a:t>10/23/2020</a:t>
             </a:fld>
             <a:endParaRPr lang="en-US"/>
           </a:p>
@@ -1621,7 +1621,7 @@
           <a:p>
             <a:fld id="{3BC1C1F4-6ABF-4EFA-90D5-B3F216C913A9}" type="datetimeFigureOut">
               <a:rPr lang="en-US" smtClean="0"/>
-              <a:t>10/22/2020</a:t>
+              <a:t>10/23/2020</a:t>
             </a:fld>
             <a:endParaRPr lang="en-US"/>
           </a:p>
@@ -1739,7 +1739,7 @@
           <a:p>
             <a:fld id="{3BC1C1F4-6ABF-4EFA-90D5-B3F216C913A9}" type="datetimeFigureOut">
               <a:rPr lang="en-US" smtClean="0"/>
-              <a:t>10/22/2020</a:t>
+              <a:t>10/23/2020</a:t>
             </a:fld>
             <a:endParaRPr lang="en-US"/>
           </a:p>
@@ -1834,7 +1834,7 @@
           <a:p>
             <a:fld id="{3BC1C1F4-6ABF-4EFA-90D5-B3F216C913A9}" type="datetimeFigureOut">
               <a:rPr lang="en-US" smtClean="0"/>
-              <a:t>10/22/2020</a:t>
+              <a:t>10/23/2020</a:t>
             </a:fld>
             <a:endParaRPr lang="en-US"/>
           </a:p>
@@ -2111,7 +2111,7 @@
           <a:p>
             <a:fld id="{3BC1C1F4-6ABF-4EFA-90D5-B3F216C913A9}" type="datetimeFigureOut">
               <a:rPr lang="en-US" smtClean="0"/>
-              <a:t>10/22/2020</a:t>
+              <a:t>10/23/2020</a:t>
             </a:fld>
             <a:endParaRPr lang="en-US"/>
           </a:p>
@@ -2364,7 +2364,7 @@
           <a:p>
             <a:fld id="{3BC1C1F4-6ABF-4EFA-90D5-B3F216C913A9}" type="datetimeFigureOut">
               <a:rPr lang="en-US" smtClean="0"/>
-              <a:t>10/22/2020</a:t>
+              <a:t>10/23/2020</a:t>
             </a:fld>
             <a:endParaRPr lang="en-US"/>
           </a:p>
@@ -2577,7 +2577,7 @@
           <a:p>
             <a:fld id="{3BC1C1F4-6ABF-4EFA-90D5-B3F216C913A9}" type="datetimeFigureOut">
               <a:rPr lang="en-US" smtClean="0"/>
-              <a:t>10/22/2020</a:t>
+              <a:t>10/23/2020</a:t>
             </a:fld>
             <a:endParaRPr lang="en-US"/>
           </a:p>
@@ -3037,6 +3037,37 @@
       </p:grpSpPr>
       <p:sp>
         <p:nvSpPr>
+          <p:cNvPr id="3" name="Content Placeholder 2"/>
+          <p:cNvSpPr>
+            <a:spLocks noGrp="1"/>
+          </p:cNvSpPr>
+          <p:nvPr>
+            <p:ph idx="1"/>
+          </p:nvPr>
+        </p:nvSpPr>
+        <p:spPr/>
+        <p:txBody>
+          <a:bodyPr>
+            <a:normAutofit/>
+          </a:bodyPr>
+          <a:lstStyle/>
+          <a:p>
+            <a:r>
+              <a:rPr lang="en-US" sz="2400"/>
+              <a:t>AWS IoT Analytics Notebook allows users to perform statistical analysis and machine learning on IoT Analytics Data sets using </a:t>
+            </a:r>
+            <a:r>
+              <a:rPr lang="en-US" sz="2400" u="sng">
+                <a:hlinkClick r:id="rId2"/>
+              </a:rPr>
+              <a:t>Jupyter Notebooks</a:t>
+            </a:r>
+            <a:endParaRPr lang="en-US" sz="2400"/>
+          </a:p>
+        </p:txBody>
+      </p:sp>
+      <p:sp>
+        <p:nvSpPr>
           <p:cNvPr id="2" name="Title 1"/>
           <p:cNvSpPr>
             <a:spLocks noGrp="1"/>
@@ -3052,11 +3083,11 @@
           <a:p>
             <a:r>
               <a:rPr lang="en-US"/>
-              <a:t>AWS </a:t>
-            </a:r>
-            <a:r>
-              <a:rPr lang="en-US" smtClean="0"/>
-              <a:t>Predictive maintenance architecture</a:t>
+              <a:t>IoT Analytics </a:t>
+            </a:r>
+            <a:r>
+              <a:rPr lang="en-US" smtClean="0"/>
+              <a:t>Notebook</a:t>
             </a:r>
             <a:endParaRPr lang="en-US"/>
           </a:p>
@@ -3064,32 +3095,90 @@
       </p:sp>
       <p:pic>
         <p:nvPicPr>
-          <p:cNvPr id="4" name="Picture 3"/>
+          <p:cNvPr id="1026" name="Picture 2" descr="Image for post"/>
           <p:cNvPicPr>
-            <a:picLocks noChangeAspect="1"/>
+            <a:picLocks noChangeAspect="1" noChangeArrowheads="1"/>
           </p:cNvPicPr>
           <p:nvPr/>
         </p:nvPicPr>
         <p:blipFill>
-          <a:blip r:embed="rId2"/>
+          <a:blip r:embed="rId3">
+            <a:extLst>
+              <a:ext uri="{28A0092B-C50C-407E-A947-70E740481C1C}">
+                <a14:useLocalDpi xmlns:a14="http://schemas.microsoft.com/office/drawing/2010/main" val="0"/>
+              </a:ext>
+            </a:extLst>
+          </a:blip>
+          <a:srcRect/>
           <a:stretch>
             <a:fillRect/>
           </a:stretch>
         </p:blipFill>
-        <p:spPr>
+        <p:spPr bwMode="auto">
           <a:xfrm>
-            <a:off x="1635369" y="1402175"/>
-            <a:ext cx="7236070" cy="4658264"/>
+            <a:off x="6093069" y="2811064"/>
+            <a:ext cx="5643442" cy="3528637"/>
           </a:xfrm>
           <a:prstGeom prst="rect">
             <a:avLst/>
           </a:prstGeom>
+          <a:noFill/>
+          <a:extLst>
+            <a:ext uri="{909E8E84-426E-40DD-AFC4-6F175D3DCCD1}">
+              <a14:hiddenFill xmlns:a14="http://schemas.microsoft.com/office/drawing/2010/main">
+                <a:solidFill>
+                  <a:srgbClr val="FFFFFF"/>
+                </a:solidFill>
+              </a14:hiddenFill>
+            </a:ext>
+          </a:extLst>
+        </p:spPr>
+      </p:pic>
+      <p:pic>
+        <p:nvPicPr>
+          <p:cNvPr id="1028" name="Picture 4" descr="Image for post"/>
+          <p:cNvPicPr>
+            <a:picLocks noChangeAspect="1" noChangeArrowheads="1"/>
+          </p:cNvPicPr>
+          <p:nvPr/>
+        </p:nvPicPr>
+        <p:blipFill>
+          <a:blip r:embed="rId4">
+            <a:extLst>
+              <a:ext uri="{28A0092B-C50C-407E-A947-70E740481C1C}">
+                <a14:useLocalDpi xmlns:a14="http://schemas.microsoft.com/office/drawing/2010/main" val="0"/>
+              </a:ext>
+            </a:extLst>
+          </a:blip>
+          <a:srcRect/>
+          <a:stretch>
+            <a:fillRect/>
+          </a:stretch>
+        </p:blipFill>
+        <p:spPr bwMode="auto">
+          <a:xfrm>
+            <a:off x="211014" y="2811064"/>
+            <a:ext cx="5598980" cy="3500836"/>
+          </a:xfrm>
+          <a:prstGeom prst="rect">
+            <a:avLst/>
+          </a:prstGeom>
+          <a:noFill/>
+          <a:extLst>
+            <a:ext uri="{909E8E84-426E-40DD-AFC4-6F175D3DCCD1}">
+              <a14:hiddenFill xmlns:a14="http://schemas.microsoft.com/office/drawing/2010/main">
+                <a:solidFill>
+                  <a:srgbClr val="FFFFFF"/>
+                </a:solidFill>
+              </a14:hiddenFill>
+            </a:ext>
+          </a:extLst>
         </p:spPr>
       </p:pic>
     </p:spTree>
     <p:extLst>
       <p:ext uri="{BB962C8B-B14F-4D97-AF65-F5344CB8AC3E}">
-        <p14:creationId xmlns:p14="http://schemas.microsoft.com/office/powerpoint/2010/main" val="2281016447"/>
+        <p14:creationId xmlns:p14="http://schemas.microsoft.com/office/powerpoint/2010/main" val="2536839982"/>
       </p:ext>
     </p:extLst>
   </p:cSld>
@@ -3133,8 +3222,13 @@
           <a:p>
             <a:r>
               <a:rPr lang="en-US"/>
-              <a:t>AWS Predictive maintenance architecture</a:t>
-            </a:r>
+              <a:t>Amazon </a:t>
+            </a:r>
+            <a:r>
+              <a:rPr lang="en-US" smtClean="0"/>
+              <a:t>QuickSight</a:t>
+            </a:r>
+            <a:endParaRPr lang="en-US"/>
           </a:p>
         </p:txBody>
       </p:sp>
@@ -3150,94 +3244,103 @@
         </p:nvSpPr>
         <p:spPr/>
         <p:txBody>
-          <a:bodyPr>
-            <a:normAutofit fontScale="92500" lnSpcReduction="20000"/>
-          </a:bodyPr>
+          <a:bodyPr/>
           <a:lstStyle/>
           <a:p>
             <a:r>
               <a:rPr lang="en-US"/>
-              <a:t>This solution includes an </a:t>
-            </a:r>
-            <a:r>
-              <a:rPr lang="en-US">
-                <a:hlinkClick r:id="rId2"/>
-              </a:rPr>
-              <a:t>AWS CloudFormation</a:t>
-            </a:r>
-            <a:r>
-              <a:rPr lang="en-US"/>
-              <a:t> template that deploys an example dataset of a </a:t>
-            </a:r>
-            <a:r>
-              <a:rPr lang="en-US">
-                <a:hlinkClick r:id="rId3"/>
-              </a:rPr>
-              <a:t>turbofan degradation simulation</a:t>
-            </a:r>
-            <a:r>
-              <a:rPr lang="en-US"/>
-              <a:t> contained in an </a:t>
-            </a:r>
-            <a:r>
-              <a:rPr lang="en-US">
-                <a:hlinkClick r:id="rId4"/>
-              </a:rPr>
-              <a:t>Amazon Simple Storage Service</a:t>
-            </a:r>
-            <a:r>
-              <a:rPr lang="en-US"/>
-              <a:t> (Amazon S3) bucket and an </a:t>
-            </a:r>
-            <a:r>
-              <a:rPr lang="en-US">
-                <a:hlinkClick r:id="rId5"/>
-              </a:rPr>
-              <a:t>Amazon SageMaker</a:t>
-            </a:r>
-            <a:r>
-              <a:rPr lang="en-US"/>
-              <a:t> endpoint with an ML model that will be trained on the dataset to predict remaining useful life (RUL).</a:t>
-            </a:r>
-          </a:p>
-          <a:p>
-            <a:r>
-              <a:rPr lang="en-US"/>
-              <a:t>The solution uses a SageMaker notebook instance to orchestrate the model, and a SageMaker training instance to perform the training. The training code and trained model are stored in the solution's Amazon S3 bucket.</a:t>
-            </a:r>
-          </a:p>
-          <a:p>
-            <a:r>
-              <a:rPr lang="en-US"/>
-              <a:t>The solution also deploys an </a:t>
-            </a:r>
-            <a:r>
-              <a:rPr lang="en-US">
-                <a:hlinkClick r:id="rId6"/>
-              </a:rPr>
-              <a:t>Amazon CloudWatch Events</a:t>
-            </a:r>
-            <a:r>
-              <a:rPr lang="en-US"/>
-              <a:t> rule that is configured to run once per day. The rule is configured to trigger an </a:t>
-            </a:r>
-            <a:r>
-              <a:rPr lang="en-US">
-                <a:hlinkClick r:id="rId7"/>
-              </a:rPr>
-              <a:t>AWS Lambda</a:t>
-            </a:r>
-            <a:r>
-              <a:rPr lang="en-US"/>
-              <a:t> function that creates an Amazon SageMaker batch transform job that uses the trained model to predict RUL from the example dataset.</a:t>
-            </a:r>
-          </a:p>
-        </p:txBody>
-      </p:sp>
+              <a:t>a wide variety of data source options for creating Amazon QuickSight Data sets</a:t>
+            </a:r>
+            <a:endParaRPr lang="en-US"/>
+          </a:p>
+        </p:txBody>
+      </p:sp>
+      <p:pic>
+        <p:nvPicPr>
+          <p:cNvPr id="2050" name="Picture 2" descr="Image for post"/>
+          <p:cNvPicPr>
+            <a:picLocks noChangeAspect="1" noChangeArrowheads="1"/>
+          </p:cNvPicPr>
+          <p:nvPr/>
+        </p:nvPicPr>
+        <p:blipFill>
+          <a:blip r:embed="rId2">
+            <a:extLst>
+              <a:ext uri="{28A0092B-C50C-407E-A947-70E740481C1C}">
+                <a14:useLocalDpi xmlns:a14="http://schemas.microsoft.com/office/drawing/2010/main" val="0"/>
+              </a:ext>
+            </a:extLst>
+          </a:blip>
+          <a:srcRect/>
+          <a:stretch>
+            <a:fillRect/>
+          </a:stretch>
+        </p:blipFill>
+        <p:spPr bwMode="auto">
+          <a:xfrm>
+            <a:off x="158262" y="2978117"/>
+            <a:ext cx="5331808" cy="3333783"/>
+          </a:xfrm>
+          <a:prstGeom prst="rect">
+            <a:avLst/>
+          </a:prstGeom>
+          <a:noFill/>
+          <a:extLst>
+            <a:ext uri="{909E8E84-426E-40DD-AFC4-6F175D3DCCD1}">
+              <a14:hiddenFill xmlns:a14="http://schemas.microsoft.com/office/drawing/2010/main">
+                <a:solidFill>
+                  <a:srgbClr val="FFFFFF"/>
+                </a:solidFill>
+              </a14:hiddenFill>
+            </a:ext>
+          </a:extLst>
+        </p:spPr>
+      </p:pic>
+      <p:pic>
+        <p:nvPicPr>
+          <p:cNvPr id="2052" name="Picture 4" descr="Image for post"/>
+          <p:cNvPicPr>
+            <a:picLocks noChangeAspect="1" noChangeArrowheads="1"/>
+          </p:cNvPicPr>
+          <p:nvPr/>
+        </p:nvPicPr>
+        <p:blipFill>
+          <a:blip r:embed="rId3">
+            <a:extLst>
+              <a:ext uri="{28A0092B-C50C-407E-A947-70E740481C1C}">
+                <a14:useLocalDpi xmlns:a14="http://schemas.microsoft.com/office/drawing/2010/main" val="0"/>
+              </a:ext>
+            </a:extLst>
+          </a:blip>
+          <a:srcRect/>
+          <a:stretch>
+            <a:fillRect/>
+          </a:stretch>
+        </p:blipFill>
+        <p:spPr bwMode="auto">
+          <a:xfrm>
+            <a:off x="5828079" y="2748903"/>
+            <a:ext cx="6064982" cy="3792210"/>
+          </a:xfrm>
+          <a:prstGeom prst="rect">
+            <a:avLst/>
+          </a:prstGeom>
+          <a:noFill/>
+          <a:extLst>
+            <a:ext uri="{909E8E84-426E-40DD-AFC4-6F175D3DCCD1}">
+              <a14:hiddenFill xmlns:a14="http://schemas.microsoft.com/office/drawing/2010/main">
+                <a:solidFill>
+                  <a:srgbClr val="FFFFFF"/>
+                </a:solidFill>
+              </a14:hiddenFill>
+            </a:ext>
+          </a:extLst>
+        </p:spPr>
+      </p:pic>
     </p:spTree>
     <p:extLst>
       <p:ext uri="{BB962C8B-B14F-4D97-AF65-F5344CB8AC3E}">
-        <p14:creationId xmlns:p14="http://schemas.microsoft.com/office/powerpoint/2010/main" val="2322710326"/>
+        <p14:creationId xmlns:p14="http://schemas.microsoft.com/office/powerpoint/2010/main" val="3778093758"/>
       </p:ext>
     </p:extLst>
   </p:cSld>
@@ -3280,129 +3383,45 @@
           <a:lstStyle/>
           <a:p>
             <a:r>
-              <a:rPr lang="en-US" smtClean="0"/>
-              <a:t>Steps to deploy </a:t>
-            </a:r>
-            <a:endParaRPr lang="en-US"/>
-          </a:p>
-        </p:txBody>
-      </p:sp>
-      <p:sp>
-        <p:nvSpPr>
-          <p:cNvPr id="3" name="Content Placeholder 2"/>
-          <p:cNvSpPr>
-            <a:spLocks noGrp="1"/>
-          </p:cNvSpPr>
-          <p:nvPr>
-            <p:ph idx="1"/>
-          </p:nvPr>
-        </p:nvSpPr>
-        <p:spPr/>
-        <p:txBody>
-          <a:bodyPr>
-            <a:normAutofit fontScale="92500" lnSpcReduction="10000"/>
-          </a:bodyPr>
-          <a:lstStyle/>
-          <a:p>
-            <a:r>
-              <a:rPr lang="en-US" u="sng">
-                <a:hlinkClick r:id="rId2"/>
-              </a:rPr>
-              <a:t>Step 1. Launch the Stack</a:t>
-            </a:r>
-            <a:endParaRPr lang="en-US"/>
-          </a:p>
-          <a:p>
-            <a:pPr lvl="1"/>
-            <a:r>
               <a:rPr lang="en-US"/>
-              <a:t>Launch the AWS CloudFormation template into your AWS account.</a:t>
-            </a:r>
-          </a:p>
-          <a:p>
-            <a:pPr lvl="1"/>
-            <a:r>
-              <a:rPr lang="en-US"/>
-              <a:t>Enter values for the required parameters: </a:t>
-            </a:r>
-            <a:r>
-              <a:rPr lang="en-US" b="1"/>
-              <a:t>Stack Name</a:t>
-            </a:r>
-            <a:r>
-              <a:rPr lang="en-US"/>
-              <a:t>, </a:t>
-            </a:r>
-            <a:r>
-              <a:rPr lang="en-US" b="1"/>
-              <a:t>Model and Data Bucket Name</a:t>
-            </a:r>
-            <a:endParaRPr lang="en-US"/>
-          </a:p>
-          <a:p>
-            <a:pPr lvl="1"/>
-            <a:r>
-              <a:rPr lang="en-US"/>
-              <a:t>Review the other template parameters, and adjust if necessary.</a:t>
-            </a:r>
-          </a:p>
-          <a:p>
-            <a:r>
-              <a:rPr lang="en-US">
-                <a:hlinkClick r:id="rId3"/>
-              </a:rPr>
-              <a:t>Step 2. Run the Notebook</a:t>
-            </a:r>
-            <a:endParaRPr lang="en-US"/>
-          </a:p>
-          <a:p>
-            <a:pPr lvl="1"/>
-            <a:r>
-              <a:rPr lang="en-US"/>
-              <a:t>Run the Jupyter Notebook to train the ML model.</a:t>
-            </a:r>
-          </a:p>
-          <a:p>
-            <a:r>
-              <a:rPr lang="en-US">
-                <a:hlinkClick r:id="rId4"/>
-              </a:rPr>
-              <a:t>Step 3. Enable the CloudWatch Events Rule</a:t>
-            </a:r>
-            <a:endParaRPr lang="en-US"/>
-          </a:p>
-          <a:p>
-            <a:pPr lvl="1"/>
-            <a:r>
-              <a:rPr lang="en-US"/>
-              <a:t>Enable the Amazon CloudWatch Events rule.</a:t>
-            </a:r>
-          </a:p>
-          <a:p>
-            <a:r>
-              <a:rPr lang="en-US">
-                <a:hlinkClick r:id="rId5"/>
-              </a:rPr>
-              <a:t>Step 4. Verify the Lambda Function Is Processing Data</a:t>
-            </a:r>
-            <a:endParaRPr lang="en-US"/>
-          </a:p>
-          <a:p>
-            <a:pPr lvl="1"/>
-            <a:r>
-              <a:rPr lang="en-US"/>
-              <a:t>Verify that the AWS Lambda function is processing data.</a:t>
-            </a:r>
-          </a:p>
-          <a:p>
-            <a:endParaRPr lang="en-US"/>
-          </a:p>
-        </p:txBody>
-      </p:sp>
+              <a:t>AWS </a:t>
+            </a:r>
+            <a:r>
+              <a:rPr lang="en-US" smtClean="0"/>
+              <a:t>Predictive maintenance architecture</a:t>
+            </a:r>
+            <a:endParaRPr lang="en-US"/>
+          </a:p>
+        </p:txBody>
+      </p:sp>
+      <p:pic>
+        <p:nvPicPr>
+          <p:cNvPr id="4" name="Picture 3"/>
+          <p:cNvPicPr>
+            <a:picLocks noChangeAspect="1"/>
+          </p:cNvPicPr>
+          <p:nvPr/>
+        </p:nvPicPr>
+        <p:blipFill>
+          <a:blip r:embed="rId2"/>
+          <a:stretch>
+            <a:fillRect/>
+          </a:stretch>
+        </p:blipFill>
+        <p:spPr>
+          <a:xfrm>
+            <a:off x="1863969" y="1490098"/>
+            <a:ext cx="7236070" cy="4658264"/>
+          </a:xfrm>
+          <a:prstGeom prst="rect">
+            <a:avLst/>
+          </a:prstGeom>
+        </p:spPr>
+      </p:pic>
     </p:spTree>
     <p:extLst>
       <p:ext uri="{BB962C8B-B14F-4D97-AF65-F5344CB8AC3E}">
-        <p14:creationId xmlns:p14="http://schemas.microsoft.com/office/powerpoint/2010/main" val="3570463678"/>
+        <p14:creationId xmlns:p14="http://schemas.microsoft.com/office/powerpoint/2010/main" val="2281016447"/>
       </p:ext>
     </p:extLst>
   </p:cSld>
@@ -3446,13 +3465,8 @@
           <a:p>
             <a:r>
               <a:rPr lang="en-US"/>
-              <a:t>Amazon CloudWatch </a:t>
-            </a:r>
-            <a:r>
-              <a:rPr lang="en-US" smtClean="0"/>
-              <a:t>Events</a:t>
-            </a:r>
-            <a:endParaRPr lang="en-US"/>
+              <a:t>AWS Predictive maintenance architecture</a:t>
+            </a:r>
           </a:p>
         </p:txBody>
       </p:sp>
@@ -3468,72 +3482,94 @@
         </p:nvSpPr>
         <p:spPr/>
         <p:txBody>
-          <a:bodyPr/>
-          <a:lstStyle/>
-          <a:p>
-            <a:r>
-              <a:rPr lang="en-US" smtClean="0"/>
-              <a:t>Events</a:t>
-            </a:r>
-            <a:endParaRPr lang="en-US"/>
-          </a:p>
-          <a:p>
-            <a:pPr lvl="1"/>
-            <a:r>
-              <a:rPr lang="en-US" smtClean="0"/>
-              <a:t>An event indicates a change in AWS environment</a:t>
-            </a:r>
-          </a:p>
-          <a:p>
-            <a:pPr lvl="1"/>
-            <a:r>
-              <a:rPr lang="en-US" smtClean="0"/>
-              <a:t>E.g. EC2 instance changes from pending to running</a:t>
-            </a:r>
-          </a:p>
-          <a:p>
-            <a:r>
-              <a:rPr lang="en-US" smtClean="0"/>
-              <a:t>Rules</a:t>
-            </a:r>
-          </a:p>
-          <a:p>
-            <a:pPr lvl="1"/>
-            <a:r>
-              <a:rPr lang="en-US" smtClean="0"/>
-              <a:t>A rule matches incoming events and routes them to targets</a:t>
-            </a:r>
-          </a:p>
-          <a:p>
-            <a:r>
-              <a:rPr lang="en-US" smtClean="0"/>
-              <a:t>Targets</a:t>
-            </a:r>
-          </a:p>
-          <a:p>
-            <a:pPr lvl="1"/>
-            <a:r>
-              <a:rPr lang="en-US" smtClean="0"/>
-              <a:t>A target processes events</a:t>
-            </a:r>
-          </a:p>
-          <a:p>
-            <a:pPr lvl="1"/>
-            <a:r>
-              <a:rPr lang="en-US" smtClean="0"/>
-              <a:t>E.g. Lambda functions, EC2 instances</a:t>
-            </a:r>
-          </a:p>
-          <a:p>
-            <a:pPr lvl="1"/>
-            <a:endParaRPr lang="en-US"/>
+          <a:bodyPr>
+            <a:normAutofit fontScale="92500" lnSpcReduction="20000"/>
+          </a:bodyPr>
+          <a:lstStyle/>
+          <a:p>
+            <a:r>
+              <a:rPr lang="en-US"/>
+              <a:t>This solution includes an </a:t>
+            </a:r>
+            <a:r>
+              <a:rPr lang="en-US">
+                <a:hlinkClick r:id="rId2"/>
+              </a:rPr>
+              <a:t>AWS CloudFormation</a:t>
+            </a:r>
+            <a:r>
+              <a:rPr lang="en-US"/>
+              <a:t> template that deploys an example dataset of a </a:t>
+            </a:r>
+            <a:r>
+              <a:rPr lang="en-US">
+                <a:hlinkClick r:id="rId3"/>
+              </a:rPr>
+              <a:t>turbofan degradation simulation</a:t>
+            </a:r>
+            <a:r>
+              <a:rPr lang="en-US"/>
+              <a:t> contained in an </a:t>
+            </a:r>
+            <a:r>
+              <a:rPr lang="en-US">
+                <a:hlinkClick r:id="rId4"/>
+              </a:rPr>
+              <a:t>Amazon Simple Storage Service</a:t>
+            </a:r>
+            <a:r>
+              <a:rPr lang="en-US"/>
+              <a:t> (Amazon S3) bucket and an </a:t>
+            </a:r>
+            <a:r>
+              <a:rPr lang="en-US">
+                <a:hlinkClick r:id="rId5"/>
+              </a:rPr>
+              <a:t>Amazon SageMaker</a:t>
+            </a:r>
+            <a:r>
+              <a:rPr lang="en-US"/>
+              <a:t> endpoint with an ML model that will be trained on the dataset to predict remaining useful life (RUL).</a:t>
+            </a:r>
+          </a:p>
+          <a:p>
+            <a:r>
+              <a:rPr lang="en-US"/>
+              <a:t>The solution uses a SageMaker notebook instance to orchestrate the model, and a SageMaker training instance to perform the training. The training code and trained model are stored in the solution's Amazon S3 bucket.</a:t>
+            </a:r>
+          </a:p>
+          <a:p>
+            <a:r>
+              <a:rPr lang="en-US"/>
+              <a:t>The solution also deploys an </a:t>
+            </a:r>
+            <a:r>
+              <a:rPr lang="en-US">
+                <a:hlinkClick r:id="rId6"/>
+              </a:rPr>
+              <a:t>Amazon CloudWatch Events</a:t>
+            </a:r>
+            <a:r>
+              <a:rPr lang="en-US"/>
+              <a:t> rule that is configured to run once per day. The rule is configured to trigger an </a:t>
+            </a:r>
+            <a:r>
+              <a:rPr lang="en-US">
+                <a:hlinkClick r:id="rId7"/>
+              </a:rPr>
+              <a:t>AWS Lambda</a:t>
+            </a:r>
+            <a:r>
+              <a:rPr lang="en-US"/>
+              <a:t> function that creates an Amazon SageMaker batch transform job that uses the trained model to predict RUL from the example dataset.</a:t>
+            </a:r>
           </a:p>
         </p:txBody>
       </p:sp>
     </p:spTree>
     <p:extLst>
       <p:ext uri="{BB962C8B-B14F-4D97-AF65-F5344CB8AC3E}">
-        <p14:creationId xmlns:p14="http://schemas.microsoft.com/office/powerpoint/2010/main" val="2505378797"/>
+        <p14:creationId xmlns:p14="http://schemas.microsoft.com/office/powerpoint/2010/main" val="2322710326"/>
       </p:ext>
     </p:extLst>
   </p:cSld>
@@ -3577,15 +3613,15 @@
           <a:p>
             <a:r>
               <a:rPr lang="en-US" smtClean="0"/>
-              <a:t>AWS Lambda</a:t>
-            </a:r>
-            <a:endParaRPr lang="en-US"/>
-          </a:p>
-        </p:txBody>
-      </p:sp>
-      <p:sp>
-        <p:nvSpPr>
-          <p:cNvPr id="5" name="Content Placeholder 4"/>
+              <a:t>Steps to deploy </a:t>
+            </a:r>
+            <a:endParaRPr lang="en-US"/>
+          </a:p>
+        </p:txBody>
+      </p:sp>
+      <p:sp>
+        <p:nvSpPr>
+          <p:cNvPr id="3" name="Content Placeholder 2"/>
           <p:cNvSpPr>
             <a:spLocks noGrp="1"/>
           </p:cNvSpPr>
@@ -3595,45 +3631,110 @@
         </p:nvSpPr>
         <p:spPr/>
         <p:txBody>
-          <a:bodyPr/>
-          <a:lstStyle/>
-          <a:p>
-            <a:r>
-              <a:rPr lang="en-US" smtClean="0"/>
-              <a:t>Configure code to run in response to events</a:t>
-            </a:r>
-            <a:endParaRPr lang="en-US"/>
-          </a:p>
-        </p:txBody>
-      </p:sp>
-      <p:pic>
-        <p:nvPicPr>
-          <p:cNvPr id="4" name="Picture 3"/>
-          <p:cNvPicPr>
-            <a:picLocks noChangeAspect="1"/>
-          </p:cNvPicPr>
-          <p:nvPr/>
-        </p:nvPicPr>
-        <p:blipFill>
-          <a:blip r:embed="rId2"/>
-          <a:stretch>
-            <a:fillRect/>
-          </a:stretch>
-        </p:blipFill>
-        <p:spPr>
-          <a:xfrm>
-            <a:off x="564356" y="2852783"/>
-            <a:ext cx="11063287" cy="2669885"/>
-          </a:xfrm>
-          <a:prstGeom prst="rect">
-            <a:avLst/>
-          </a:prstGeom>
-        </p:spPr>
-      </p:pic>
+          <a:bodyPr>
+            <a:normAutofit fontScale="92500" lnSpcReduction="10000"/>
+          </a:bodyPr>
+          <a:lstStyle/>
+          <a:p>
+            <a:r>
+              <a:rPr lang="en-US" u="sng">
+                <a:hlinkClick r:id="rId2"/>
+              </a:rPr>
+              <a:t>Step 1. Launch the Stack</a:t>
+            </a:r>
+            <a:endParaRPr lang="en-US"/>
+          </a:p>
+          <a:p>
+            <a:pPr lvl="1"/>
+            <a:r>
+              <a:rPr lang="en-US"/>
+              <a:t>Launch the AWS CloudFormation template into your AWS account.</a:t>
+            </a:r>
+          </a:p>
+          <a:p>
+            <a:pPr lvl="1"/>
+            <a:r>
+              <a:rPr lang="en-US"/>
+              <a:t>Enter values for the required parameters: </a:t>
+            </a:r>
+            <a:r>
+              <a:rPr lang="en-US" b="1"/>
+              <a:t>Stack Name</a:t>
+            </a:r>
+            <a:r>
+              <a:rPr lang="en-US"/>
+              <a:t>, </a:t>
+            </a:r>
+            <a:r>
+              <a:rPr lang="en-US" b="1"/>
+              <a:t>Model and Data Bucket Name</a:t>
+            </a:r>
+            <a:endParaRPr lang="en-US"/>
+          </a:p>
+          <a:p>
+            <a:pPr lvl="1"/>
+            <a:r>
+              <a:rPr lang="en-US"/>
+              <a:t>Review the other template parameters, and adjust if necessary.</a:t>
+            </a:r>
+          </a:p>
+          <a:p>
+            <a:r>
+              <a:rPr lang="en-US">
+                <a:hlinkClick r:id="rId3"/>
+              </a:rPr>
+              <a:t>Step 2. Run the Notebook</a:t>
+            </a:r>
+            <a:endParaRPr lang="en-US"/>
+          </a:p>
+          <a:p>
+            <a:pPr lvl="1"/>
+            <a:r>
+              <a:rPr lang="en-US"/>
+              <a:t>Run the Jupyter Notebook to train the ML model.</a:t>
+            </a:r>
+          </a:p>
+          <a:p>
+            <a:r>
+              <a:rPr lang="en-US">
+                <a:hlinkClick r:id="rId4"/>
+              </a:rPr>
+              <a:t>Step 3. Enable the CloudWatch Events Rule</a:t>
+            </a:r>
+            <a:endParaRPr lang="en-US"/>
+          </a:p>
+          <a:p>
+            <a:pPr lvl="1"/>
+            <a:r>
+              <a:rPr lang="en-US"/>
+              <a:t>Enable the Amazon CloudWatch Events rule.</a:t>
+            </a:r>
+          </a:p>
+          <a:p>
+            <a:r>
+              <a:rPr lang="en-US">
+                <a:hlinkClick r:id="rId5"/>
+              </a:rPr>
+              <a:t>Step 4. Verify the Lambda Function Is Processing Data</a:t>
+            </a:r>
+            <a:endParaRPr lang="en-US"/>
+          </a:p>
+          <a:p>
+            <a:pPr lvl="1"/>
+            <a:r>
+              <a:rPr lang="en-US"/>
+              <a:t>Verify that the AWS Lambda function is processing data.</a:t>
+            </a:r>
+          </a:p>
+          <a:p>
+            <a:endParaRPr lang="en-US"/>
+          </a:p>
+        </p:txBody>
+      </p:sp>
     </p:spTree>
     <p:extLst>
       <p:ext uri="{BB962C8B-B14F-4D97-AF65-F5344CB8AC3E}">
-        <p14:creationId xmlns:p14="http://schemas.microsoft.com/office/powerpoint/2010/main" val="863799276"/>
+        <p14:creationId xmlns:p14="http://schemas.microsoft.com/office/powerpoint/2010/main" val="3570463678"/>
       </p:ext>
     </p:extLst>
   </p:cSld>
@@ -3841,126 +3942,64 @@
           <a:p>
             <a:r>
               <a:rPr lang="en-US" smtClean="0"/>
-              <a:t>AWS CloudFormation</a:t>
-            </a:r>
-            <a:endParaRPr lang="en-US"/>
-          </a:p>
-        </p:txBody>
-      </p:sp>
-      <p:sp>
-        <p:nvSpPr>
-          <p:cNvPr id="3" name="Content Placeholder 2"/>
-          <p:cNvSpPr>
-            <a:spLocks noGrp="1"/>
-          </p:cNvSpPr>
-          <p:nvPr>
-            <p:ph idx="1"/>
-          </p:nvPr>
-        </p:nvSpPr>
-        <p:spPr/>
-        <p:txBody>
-          <a:bodyPr>
-            <a:normAutofit/>
-          </a:bodyPr>
-          <a:lstStyle/>
-          <a:p>
-            <a:r>
-              <a:rPr lang="en-US"/>
-              <a:t>Use the CloudFormation template, iot-analytics.yaml, to create an IoT Analytics stack containing (17) resources, including the following.</a:t>
-            </a:r>
-          </a:p>
-          <a:p>
-            <a:pPr lvl="1"/>
-            <a:r>
-              <a:rPr lang="en-US"/>
-              <a:t>(3) AWS IoT Things</a:t>
-            </a:r>
-          </a:p>
-          <a:p>
-            <a:pPr lvl="1"/>
-            <a:r>
-              <a:rPr lang="en-US"/>
-              <a:t>(1) AWS IoT Core Topic Rule</a:t>
-            </a:r>
-          </a:p>
-          <a:p>
-            <a:pPr lvl="1"/>
-            <a:r>
-              <a:rPr lang="en-US"/>
-              <a:t>(1) AWS IoT Analytics Channel, Pipeline, Data store, and Data set</a:t>
-            </a:r>
-          </a:p>
-          <a:p>
-            <a:pPr lvl="1"/>
-            <a:r>
-              <a:rPr lang="en-US"/>
-              <a:t>(1) AWS Lambda and Lambda Permission</a:t>
-            </a:r>
-          </a:p>
-          <a:p>
-            <a:pPr lvl="1"/>
-            <a:r>
-              <a:rPr lang="en-US"/>
-              <a:t>(1) Amazon S3 Bucket</a:t>
-            </a:r>
-          </a:p>
-          <a:p>
-            <a:pPr lvl="1"/>
-            <a:r>
-              <a:rPr lang="en-US"/>
-              <a:t>(1) Amazon SageMaker Notebook Instance</a:t>
-            </a:r>
-          </a:p>
-          <a:p>
-            <a:pPr lvl="1"/>
-            <a:r>
-              <a:rPr lang="en-US"/>
-              <a:t>(5) AWS IAM Roles</a:t>
-            </a:r>
-          </a:p>
-        </p:txBody>
-      </p:sp>
-      <p:sp>
-        <p:nvSpPr>
-          <p:cNvPr id="4" name="Rectangle 3"/>
-          <p:cNvSpPr/>
+              <a:t>Things, rules and actions</a:t>
+            </a:r>
+            <a:endParaRPr lang="en-US"/>
+          </a:p>
+        </p:txBody>
+      </p:sp>
+      <p:pic>
+        <p:nvPicPr>
+          <p:cNvPr id="4" name="Picture 3"/>
+          <p:cNvPicPr>
+            <a:picLocks noChangeAspect="1"/>
+          </p:cNvPicPr>
           <p:nvPr/>
-        </p:nvSpPr>
+        </p:nvPicPr>
+        <p:blipFill>
+          <a:blip r:embed="rId2"/>
+          <a:stretch>
+            <a:fillRect/>
+          </a:stretch>
+        </p:blipFill>
         <p:spPr>
           <a:xfrm>
-            <a:off x="973015" y="5807631"/>
-            <a:ext cx="10087708" cy="369332"/>
+            <a:off x="5498787" y="1601482"/>
+            <a:ext cx="6693213" cy="3907082"/>
           </a:xfrm>
           <a:prstGeom prst="rect">
             <a:avLst/>
           </a:prstGeom>
         </p:spPr>
-        <p:txBody>
-          <a:bodyPr wrap="square">
-            <a:spAutoFit/>
-          </a:bodyPr>
-          <a:lstStyle/>
-          <a:p>
-            <a:r>
-              <a:rPr lang="en-US" smtClean="0">
-                <a:hlinkClick r:id="rId2"/>
-              </a:rPr>
-              <a:t>https</a:t>
-            </a:r>
-            <a:r>
-              <a:rPr lang="en-US">
-                <a:hlinkClick r:id="rId2"/>
-              </a:rPr>
-              <a:t>://towardsdatascience.com/getting-started-with-iot-analytics-on-aws-5f2093bcf704</a:t>
-            </a:r>
-            <a:endParaRPr lang="en-US"/>
-          </a:p>
-        </p:txBody>
-      </p:sp>
+      </p:pic>
+      <p:pic>
+        <p:nvPicPr>
+          <p:cNvPr id="5" name="Picture 4"/>
+          <p:cNvPicPr>
+            <a:picLocks noChangeAspect="1"/>
+          </p:cNvPicPr>
+          <p:nvPr/>
+        </p:nvPicPr>
+        <p:blipFill>
+          <a:blip r:embed="rId3"/>
+          <a:stretch>
+            <a:fillRect/>
+          </a:stretch>
+        </p:blipFill>
+        <p:spPr>
+          <a:xfrm>
+            <a:off x="167053" y="1782924"/>
+            <a:ext cx="4835770" cy="3544198"/>
+          </a:xfrm>
+          <a:prstGeom prst="rect">
+            <a:avLst/>
+          </a:prstGeom>
+        </p:spPr>
+      </p:pic>
     </p:spTree>
     <p:extLst>
       <p:ext uri="{BB962C8B-B14F-4D97-AF65-F5344CB8AC3E}">
-        <p14:creationId xmlns:p14="http://schemas.microsoft.com/office/powerpoint/2010/main" val="3035742588"/>
+        <p14:creationId xmlns:p14="http://schemas.microsoft.com/office/powerpoint/2010/main" val="4036106335"/>
       </p:ext>
     </p:extLst>
   </p:cSld>
@@ -4004,40 +4043,126 @@
           <a:p>
             <a:r>
               <a:rPr lang="en-US" smtClean="0"/>
-              <a:t>AWS IoT Analytics</a:t>
-            </a:r>
-            <a:endParaRPr lang="en-US"/>
-          </a:p>
-        </p:txBody>
-      </p:sp>
-      <p:pic>
-        <p:nvPicPr>
-          <p:cNvPr id="5" name="Picture 4"/>
-          <p:cNvPicPr>
-            <a:picLocks noChangeAspect="1"/>
-          </p:cNvPicPr>
+              <a:t>AWS CloudFormation</a:t>
+            </a:r>
+            <a:endParaRPr lang="en-US"/>
+          </a:p>
+        </p:txBody>
+      </p:sp>
+      <p:sp>
+        <p:nvSpPr>
+          <p:cNvPr id="3" name="Content Placeholder 2"/>
+          <p:cNvSpPr>
+            <a:spLocks noGrp="1"/>
+          </p:cNvSpPr>
+          <p:nvPr>
+            <p:ph idx="1"/>
+          </p:nvPr>
+        </p:nvSpPr>
+        <p:spPr/>
+        <p:txBody>
+          <a:bodyPr>
+            <a:normAutofit/>
+          </a:bodyPr>
+          <a:lstStyle/>
+          <a:p>
+            <a:r>
+              <a:rPr lang="en-US"/>
+              <a:t>Use the CloudFormation template, iot-analytics.yaml, to create an IoT Analytics stack containing (17) resources, including the following.</a:t>
+            </a:r>
+          </a:p>
+          <a:p>
+            <a:pPr lvl="1"/>
+            <a:r>
+              <a:rPr lang="en-US"/>
+              <a:t>(3) AWS IoT Things</a:t>
+            </a:r>
+          </a:p>
+          <a:p>
+            <a:pPr lvl="1"/>
+            <a:r>
+              <a:rPr lang="en-US"/>
+              <a:t>(1) AWS IoT Core Topic Rule</a:t>
+            </a:r>
+          </a:p>
+          <a:p>
+            <a:pPr lvl="1"/>
+            <a:r>
+              <a:rPr lang="en-US"/>
+              <a:t>(1) AWS IoT Analytics Channel, Pipeline, Data store, and Data set</a:t>
+            </a:r>
+          </a:p>
+          <a:p>
+            <a:pPr lvl="1"/>
+            <a:r>
+              <a:rPr lang="en-US"/>
+              <a:t>(1) AWS Lambda and Lambda Permission</a:t>
+            </a:r>
+          </a:p>
+          <a:p>
+            <a:pPr lvl="1"/>
+            <a:r>
+              <a:rPr lang="en-US"/>
+              <a:t>(1) Amazon S3 Bucket</a:t>
+            </a:r>
+          </a:p>
+          <a:p>
+            <a:pPr lvl="1"/>
+            <a:r>
+              <a:rPr lang="en-US"/>
+              <a:t>(1) Amazon SageMaker Notebook Instance</a:t>
+            </a:r>
+          </a:p>
+          <a:p>
+            <a:pPr lvl="1"/>
+            <a:r>
+              <a:rPr lang="en-US"/>
+              <a:t>(5) AWS IAM Roles</a:t>
+            </a:r>
+          </a:p>
+        </p:txBody>
+      </p:sp>
+      <p:sp>
+        <p:nvSpPr>
+          <p:cNvPr id="4" name="Rectangle 3"/>
+          <p:cNvSpPr/>
           <p:nvPr/>
-        </p:nvPicPr>
-        <p:blipFill>
-          <a:blip r:embed="rId2"/>
-          <a:stretch>
-            <a:fillRect/>
-          </a:stretch>
-        </p:blipFill>
+        </p:nvSpPr>
         <p:spPr>
           <a:xfrm>
-            <a:off x="838200" y="1298464"/>
-            <a:ext cx="7153834" cy="5441805"/>
+            <a:off x="973015" y="5807631"/>
+            <a:ext cx="10087708" cy="369332"/>
           </a:xfrm>
           <a:prstGeom prst="rect">
             <a:avLst/>
           </a:prstGeom>
         </p:spPr>
-      </p:pic>
+        <p:txBody>
+          <a:bodyPr wrap="square">
+            <a:spAutoFit/>
+          </a:bodyPr>
+          <a:lstStyle/>
+          <a:p>
+            <a:r>
+              <a:rPr lang="en-US" smtClean="0">
+                <a:hlinkClick r:id="rId2"/>
+              </a:rPr>
+              <a:t>https</a:t>
+            </a:r>
+            <a:r>
+              <a:rPr lang="en-US">
+                <a:hlinkClick r:id="rId2"/>
+              </a:rPr>
+              <a:t>://towardsdatascience.com/getting-started-with-iot-analytics-on-aws-5f2093bcf704</a:t>
+            </a:r>
+            <a:endParaRPr lang="en-US"/>
+          </a:p>
+        </p:txBody>
+      </p:sp>
     </p:spTree>
     <p:extLst>
       <p:ext uri="{BB962C8B-B14F-4D97-AF65-F5344CB8AC3E}">
-        <p14:creationId xmlns:p14="http://schemas.microsoft.com/office/powerpoint/2010/main" val="1253626712"/>
+        <p14:creationId xmlns:p14="http://schemas.microsoft.com/office/powerpoint/2010/main" val="3035742588"/>
       </p:ext>
     </p:extLst>
   </p:cSld>
@@ -4081,6 +4206,83 @@
           <a:p>
             <a:r>
               <a:rPr lang="en-US" smtClean="0"/>
+              <a:t>AWS IoT Analytics</a:t>
+            </a:r>
+            <a:endParaRPr lang="en-US"/>
+          </a:p>
+        </p:txBody>
+      </p:sp>
+      <p:pic>
+        <p:nvPicPr>
+          <p:cNvPr id="5" name="Picture 4"/>
+          <p:cNvPicPr>
+            <a:picLocks noChangeAspect="1"/>
+          </p:cNvPicPr>
+          <p:nvPr/>
+        </p:nvPicPr>
+        <p:blipFill>
+          <a:blip r:embed="rId2"/>
+          <a:stretch>
+            <a:fillRect/>
+          </a:stretch>
+        </p:blipFill>
+        <p:spPr>
+          <a:xfrm>
+            <a:off x="2280139" y="1351218"/>
+            <a:ext cx="7153834" cy="5441805"/>
+          </a:xfrm>
+          <a:prstGeom prst="rect">
+            <a:avLst/>
+          </a:prstGeom>
+        </p:spPr>
+      </p:pic>
+    </p:spTree>
+    <p:extLst>
+      <p:ext uri="{BB962C8B-B14F-4D97-AF65-F5344CB8AC3E}">
+        <p14:creationId xmlns:p14="http://schemas.microsoft.com/office/powerpoint/2010/main" val="1253626712"/>
+      </p:ext>
+    </p:extLst>
+  </p:cSld>
+  <p:clrMapOvr>
+    <a:masterClrMapping/>
+  </p:clrMapOvr>
+</p:sld>
+</file>
+
+<file path=ppt/slides/slide6.xml><?xml version="1.0" encoding="utf-8"?>
+<p:sld xmlns:a="http://schemas.openxmlformats.org/drawingml/2006/main" xmlns:r="http://schemas.openxmlformats.org/officeDocument/2006/relationships" xmlns:p="http://schemas.openxmlformats.org/presentationml/2006/main">
+  <p:cSld>
+    <p:spTree>
+      <p:nvGrpSpPr>
+        <p:cNvPr id="1" name=""/>
+        <p:cNvGrpSpPr/>
+        <p:nvPr/>
+      </p:nvGrpSpPr>
+      <p:grpSpPr>
+        <a:xfrm>
+          <a:off x="0" y="0"/>
+          <a:ext cx="0" cy="0"/>
+          <a:chOff x="0" y="0"/>
+          <a:chExt cx="0" cy="0"/>
+        </a:xfrm>
+      </p:grpSpPr>
+      <p:sp>
+        <p:nvSpPr>
+          <p:cNvPr id="2" name="Title 1"/>
+          <p:cNvSpPr>
+            <a:spLocks noGrp="1"/>
+          </p:cNvSpPr>
+          <p:nvPr>
+            <p:ph type="title"/>
+          </p:nvPr>
+        </p:nvSpPr>
+        <p:spPr/>
+        <p:txBody>
+          <a:bodyPr/>
+          <a:lstStyle/>
+          <a:p>
+            <a:r>
+              <a:rPr lang="en-US" smtClean="0"/>
               <a:t>IoT Analytics Channel</a:t>
             </a:r>
             <a:endParaRPr lang="en-US"/>
@@ -4112,11 +4314,7 @@
             </a:r>
             <a:r>
               <a:rPr lang="en-US"/>
-              <a:t>IoT Analytics Channel pulls messages or data into IoT Analytics from other </a:t>
-            </a:r>
-            <a:r>
-              <a:rPr lang="en-US"/>
-              <a:t>AWS </a:t>
+              <a:t>IoT Analytics Channel pulls messages or data into IoT Analytics from other AWS </a:t>
             </a:r>
             <a:r>
               <a:rPr lang="en-US" smtClean="0"/>
@@ -4133,7 +4331,6 @@
               <a:rPr lang="en-US"/>
               <a:t>Amazon S3, Amazon Kinesis, or Amazon IoT Core</a:t>
             </a:r>
-            <a:endParaRPr lang="en-US"/>
           </a:p>
         </p:txBody>
       </p:sp>
@@ -4174,7 +4371,7 @@
 </p:sld>
 </file>
 
-<file path=ppt/slides/slide6.xml><?xml version="1.0" encoding="utf-8"?>
+<file path=ppt/slides/slide7.xml><?xml version="1.0" encoding="utf-8"?>
 <p:sld xmlns:a="http://schemas.openxmlformats.org/drawingml/2006/main" xmlns:r="http://schemas.openxmlformats.org/officeDocument/2006/relationships" xmlns:p="http://schemas.openxmlformats.org/presentationml/2006/main">
   <p:cSld>
     <p:spTree>
@@ -4208,11 +4405,7 @@
           <a:p>
             <a:r>
               <a:rPr lang="en-US"/>
-              <a:t>IoT </a:t>
-            </a:r>
-            <a:r>
-              <a:rPr lang="en-US"/>
-              <a:t>Analytics </a:t>
+              <a:t>IoT Analytics </a:t>
             </a:r>
             <a:r>
               <a:rPr lang="en-US" smtClean="0"/>
@@ -4281,7 +4474,7 @@
 </p:sld>
 </file>
 
-<file path=ppt/slides/slide7.xml><?xml version="1.0" encoding="utf-8"?>
+<file path=ppt/slides/slide8.xml><?xml version="1.0" encoding="utf-8"?>
 <p:sld xmlns:a="http://schemas.openxmlformats.org/drawingml/2006/main" xmlns:r="http://schemas.openxmlformats.org/officeDocument/2006/relationships" xmlns:p="http://schemas.openxmlformats.org/presentationml/2006/main">
   <p:cSld>
     <p:spTree>
@@ -4315,11 +4508,7 @@
           <a:p>
             <a:r>
               <a:rPr lang="en-US"/>
-              <a:t>IoT Analytics </a:t>
-            </a:r>
-            <a:r>
-              <a:rPr lang="en-US"/>
-              <a:t>Data </a:t>
+              <a:t>IoT Analytics Data </a:t>
             </a:r>
             <a:r>
               <a:rPr lang="en-US" smtClean="0"/>
@@ -4348,7 +4537,6 @@
               <a:rPr lang="en-US"/>
               <a:t>AWS IoT Analytics Data store stores prepared data from an AWS IoT Analytics Pipeline, in a fully-managed database</a:t>
             </a:r>
-            <a:endParaRPr lang="en-US"/>
           </a:p>
         </p:txBody>
       </p:sp>
@@ -4389,7 +4577,7 @@
 </p:sld>
 </file>
 
-<file path=ppt/slides/slide8.xml><?xml version="1.0" encoding="utf-8"?>
+<file path=ppt/slides/slide9.xml><?xml version="1.0" encoding="utf-8"?>
 <p:sld xmlns:a="http://schemas.openxmlformats.org/drawingml/2006/main" xmlns:r="http://schemas.openxmlformats.org/officeDocument/2006/relationships" xmlns:p="http://schemas.openxmlformats.org/presentationml/2006/main">
   <p:cSld>
     <p:spTree>
@@ -4478,98 +4666,6 @@
     <p:extLst>
       <p:ext uri="{BB962C8B-B14F-4D97-AF65-F5344CB8AC3E}">
         <p14:creationId xmlns:p14="http://schemas.microsoft.com/office/powerpoint/2010/main" val="908538385"/>
-      </p:ext>
-    </p:extLst>
-  </p:cSld>
-  <p:clrMapOvr>
-    <a:masterClrMapping/>
-  </p:clrMapOvr>
-</p:sld>
-</file>
-
-<file path=ppt/slides/slide9.xml><?xml version="1.0" encoding="utf-8"?>
-<p:sld xmlns:a="http://schemas.openxmlformats.org/drawingml/2006/main" xmlns:r="http://schemas.openxmlformats.org/officeDocument/2006/relationships" xmlns:p="http://schemas.openxmlformats.org/presentationml/2006/main">
-  <p:cSld>
-    <p:spTree>
-      <p:nvGrpSpPr>
-        <p:cNvPr id="1" name=""/>
-        <p:cNvGrpSpPr/>
-        <p:nvPr/>
-      </p:nvGrpSpPr>
-      <p:grpSpPr>
-        <a:xfrm>
-          <a:off x="0" y="0"/>
-          <a:ext cx="0" cy="0"/>
-          <a:chOff x="0" y="0"/>
-          <a:chExt cx="0" cy="0"/>
-        </a:xfrm>
-      </p:grpSpPr>
-      <p:sp>
-        <p:nvSpPr>
-          <p:cNvPr id="3" name="Content Placeholder 2"/>
-          <p:cNvSpPr>
-            <a:spLocks noGrp="1"/>
-          </p:cNvSpPr>
-          <p:nvPr>
-            <p:ph idx="1"/>
-          </p:nvPr>
-        </p:nvSpPr>
-        <p:spPr/>
-        <p:txBody>
-          <a:bodyPr>
-            <a:normAutofit/>
-          </a:bodyPr>
-          <a:lstStyle/>
-          <a:p>
-            <a:r>
-              <a:rPr lang="en-US" sz="2400"/>
-              <a:t>AWS IoT Analytics Notebook allows users to perform statistical analysis and machine learning on IoT Analytics Data sets using </a:t>
-            </a:r>
-            <a:r>
-              <a:rPr lang="en-US" sz="2400" u="sng">
-                <a:hlinkClick r:id="rId2"/>
-              </a:rPr>
-              <a:t>Jupyter Notebooks</a:t>
-            </a:r>
-            <a:endParaRPr lang="en-US" sz="2400"/>
-          </a:p>
-        </p:txBody>
-      </p:sp>
-      <p:sp>
-        <p:nvSpPr>
-          <p:cNvPr id="2" name="Title 1"/>
-          <p:cNvSpPr>
-            <a:spLocks noGrp="1"/>
-          </p:cNvSpPr>
-          <p:nvPr>
-            <p:ph type="title"/>
-          </p:nvPr>
-        </p:nvSpPr>
-        <p:spPr/>
-        <p:txBody>
-          <a:bodyPr/>
-          <a:lstStyle/>
-          <a:p>
-            <a:r>
-              <a:rPr lang="en-US"/>
-              <a:t>IoT </a:t>
-            </a:r>
-            <a:r>
-              <a:rPr lang="en-US"/>
-              <a:t>Analytics </a:t>
-            </a:r>
-            <a:r>
-              <a:rPr lang="en-US" smtClean="0"/>
-              <a:t>Notebook</a:t>
-            </a:r>
-            <a:endParaRPr lang="en-US"/>
-          </a:p>
-        </p:txBody>
-      </p:sp>
-    </p:spTree>
-    <p:extLst>
-      <p:ext uri="{BB962C8B-B14F-4D97-AF65-F5344CB8AC3E}">
-        <p14:creationId xmlns:p14="http://schemas.microsoft.com/office/powerpoint/2010/main" val="2536839982"/>
       </p:ext>
     </p:extLst>
   </p:cSld>

</xml_diff>

<commit_message>
add slide on machine learning and iot app
</commit_message>
<xml_diff>
--- a/IoT analytics.pptx
+++ b/IoT analytics.pptx
@@ -16,9 +16,19 @@
     <p:sldId id="272" r:id="rId10"/>
     <p:sldId id="273" r:id="rId11"/>
     <p:sldId id="274" r:id="rId12"/>
-    <p:sldId id="259" r:id="rId13"/>
-    <p:sldId id="264" r:id="rId14"/>
-    <p:sldId id="265" r:id="rId15"/>
+    <p:sldId id="285" r:id="rId13"/>
+    <p:sldId id="259" r:id="rId14"/>
+    <p:sldId id="264" r:id="rId15"/>
+    <p:sldId id="265" r:id="rId16"/>
+    <p:sldId id="277" r:id="rId17"/>
+    <p:sldId id="278" r:id="rId18"/>
+    <p:sldId id="282" r:id="rId19"/>
+    <p:sldId id="279" r:id="rId20"/>
+    <p:sldId id="280" r:id="rId21"/>
+    <p:sldId id="281" r:id="rId22"/>
+    <p:sldId id="283" r:id="rId23"/>
+    <p:sldId id="284" r:id="rId24"/>
+    <p:sldId id="286" r:id="rId25"/>
   </p:sldIdLst>
   <p:sldSz cx="12192000" cy="6858000"/>
   <p:notesSz cx="6858000" cy="9144000"/>
@@ -256,7 +266,7 @@
           <a:p>
             <a:fld id="{3BC1C1F4-6ABF-4EFA-90D5-B3F216C913A9}" type="datetimeFigureOut">
               <a:rPr lang="en-US" smtClean="0"/>
-              <a:t>10/23/2020</a:t>
+              <a:t>11/4/2020</a:t>
             </a:fld>
             <a:endParaRPr lang="en-US"/>
           </a:p>
@@ -426,7 +436,7 @@
           <a:p>
             <a:fld id="{3BC1C1F4-6ABF-4EFA-90D5-B3F216C913A9}" type="datetimeFigureOut">
               <a:rPr lang="en-US" smtClean="0"/>
-              <a:t>10/23/2020</a:t>
+              <a:t>11/4/2020</a:t>
             </a:fld>
             <a:endParaRPr lang="en-US"/>
           </a:p>
@@ -606,7 +616,7 @@
           <a:p>
             <a:fld id="{3BC1C1F4-6ABF-4EFA-90D5-B3F216C913A9}" type="datetimeFigureOut">
               <a:rPr lang="en-US" smtClean="0"/>
-              <a:t>10/23/2020</a:t>
+              <a:t>11/4/2020</a:t>
             </a:fld>
             <a:endParaRPr lang="en-US"/>
           </a:p>
@@ -776,7 +786,7 @@
           <a:p>
             <a:fld id="{3BC1C1F4-6ABF-4EFA-90D5-B3F216C913A9}" type="datetimeFigureOut">
               <a:rPr lang="en-US" smtClean="0"/>
-              <a:t>10/23/2020</a:t>
+              <a:t>11/4/2020</a:t>
             </a:fld>
             <a:endParaRPr lang="en-US"/>
           </a:p>
@@ -1022,7 +1032,7 @@
           <a:p>
             <a:fld id="{3BC1C1F4-6ABF-4EFA-90D5-B3F216C913A9}" type="datetimeFigureOut">
               <a:rPr lang="en-US" smtClean="0"/>
-              <a:t>10/23/2020</a:t>
+              <a:t>11/4/2020</a:t>
             </a:fld>
             <a:endParaRPr lang="en-US"/>
           </a:p>
@@ -1254,7 +1264,7 @@
           <a:p>
             <a:fld id="{3BC1C1F4-6ABF-4EFA-90D5-B3F216C913A9}" type="datetimeFigureOut">
               <a:rPr lang="en-US" smtClean="0"/>
-              <a:t>10/23/2020</a:t>
+              <a:t>11/4/2020</a:t>
             </a:fld>
             <a:endParaRPr lang="en-US"/>
           </a:p>
@@ -1621,7 +1631,7 @@
           <a:p>
             <a:fld id="{3BC1C1F4-6ABF-4EFA-90D5-B3F216C913A9}" type="datetimeFigureOut">
               <a:rPr lang="en-US" smtClean="0"/>
-              <a:t>10/23/2020</a:t>
+              <a:t>11/4/2020</a:t>
             </a:fld>
             <a:endParaRPr lang="en-US"/>
           </a:p>
@@ -1739,7 +1749,7 @@
           <a:p>
             <a:fld id="{3BC1C1F4-6ABF-4EFA-90D5-B3F216C913A9}" type="datetimeFigureOut">
               <a:rPr lang="en-US" smtClean="0"/>
-              <a:t>10/23/2020</a:t>
+              <a:t>11/4/2020</a:t>
             </a:fld>
             <a:endParaRPr lang="en-US"/>
           </a:p>
@@ -1834,7 +1844,7 @@
           <a:p>
             <a:fld id="{3BC1C1F4-6ABF-4EFA-90D5-B3F216C913A9}" type="datetimeFigureOut">
               <a:rPr lang="en-US" smtClean="0"/>
-              <a:t>10/23/2020</a:t>
+              <a:t>11/4/2020</a:t>
             </a:fld>
             <a:endParaRPr lang="en-US"/>
           </a:p>
@@ -2111,7 +2121,7 @@
           <a:p>
             <a:fld id="{3BC1C1F4-6ABF-4EFA-90D5-B3F216C913A9}" type="datetimeFigureOut">
               <a:rPr lang="en-US" smtClean="0"/>
-              <a:t>10/23/2020</a:t>
+              <a:t>11/4/2020</a:t>
             </a:fld>
             <a:endParaRPr lang="en-US"/>
           </a:p>
@@ -2364,7 +2374,7 @@
           <a:p>
             <a:fld id="{3BC1C1F4-6ABF-4EFA-90D5-B3F216C913A9}" type="datetimeFigureOut">
               <a:rPr lang="en-US" smtClean="0"/>
-              <a:t>10/23/2020</a:t>
+              <a:t>11/4/2020</a:t>
             </a:fld>
             <a:endParaRPr lang="en-US"/>
           </a:p>
@@ -2577,7 +2587,7 @@
           <a:p>
             <a:fld id="{3BC1C1F4-6ABF-4EFA-90D5-B3F216C913A9}" type="datetimeFigureOut">
               <a:rPr lang="en-US" smtClean="0"/>
-              <a:t>10/23/2020</a:t>
+              <a:t>11/4/2020</a:t>
             </a:fld>
             <a:endParaRPr lang="en-US"/>
           </a:p>
@@ -2989,7 +2999,7 @@
             <a:spLocks noGrp="1"/>
           </p:cNvSpPr>
           <p:nvPr>
-            <p:ph type="ctrTitle"/>
+            <p:ph type="title"/>
           </p:nvPr>
         </p:nvSpPr>
         <p:spPr/>
@@ -3001,6 +3011,25 @@
               <a:rPr lang="en-US" smtClean="0"/>
               <a:t>AWS IoT pipeline</a:t>
             </a:r>
+            <a:endParaRPr lang="en-US"/>
+          </a:p>
+        </p:txBody>
+      </p:sp>
+      <p:sp>
+        <p:nvSpPr>
+          <p:cNvPr id="3" name="Text Placeholder 2"/>
+          <p:cNvSpPr>
+            <a:spLocks noGrp="1"/>
+          </p:cNvSpPr>
+          <p:nvPr>
+            <p:ph type="body" idx="1"/>
+          </p:nvPr>
+        </p:nvSpPr>
+        <p:spPr/>
+        <p:txBody>
+          <a:bodyPr/>
+          <a:lstStyle/>
+          <a:p>
             <a:endParaRPr lang="en-US"/>
           </a:p>
         </p:txBody>
@@ -3251,7 +3280,6 @@
               <a:rPr lang="en-US"/>
               <a:t>a wide variety of data source options for creating Amazon QuickSight Data sets</a:t>
             </a:r>
-            <a:endParaRPr lang="en-US"/>
           </a:p>
         </p:txBody>
       </p:sp>
@@ -3369,6 +3397,82 @@
       </p:grpSpPr>
       <p:sp>
         <p:nvSpPr>
+          <p:cNvPr id="4" name="Title 3"/>
+          <p:cNvSpPr>
+            <a:spLocks noGrp="1"/>
+          </p:cNvSpPr>
+          <p:nvPr>
+            <p:ph type="title"/>
+          </p:nvPr>
+        </p:nvSpPr>
+        <p:spPr/>
+        <p:txBody>
+          <a:bodyPr/>
+          <a:lstStyle/>
+          <a:p>
+            <a:r>
+              <a:rPr lang="en-US"/>
+              <a:t>Predictive </a:t>
+            </a:r>
+            <a:r>
+              <a:rPr lang="en-US" smtClean="0"/>
+              <a:t>maintenance use case</a:t>
+            </a:r>
+            <a:endParaRPr lang="en-US"/>
+          </a:p>
+        </p:txBody>
+      </p:sp>
+      <p:sp>
+        <p:nvSpPr>
+          <p:cNvPr id="5" name="Text Placeholder 4"/>
+          <p:cNvSpPr>
+            <a:spLocks noGrp="1"/>
+          </p:cNvSpPr>
+          <p:nvPr>
+            <p:ph type="body" idx="1"/>
+          </p:nvPr>
+        </p:nvSpPr>
+        <p:spPr/>
+        <p:txBody>
+          <a:bodyPr/>
+          <a:lstStyle/>
+          <a:p>
+            <a:endParaRPr lang="en-US"/>
+          </a:p>
+        </p:txBody>
+      </p:sp>
+    </p:spTree>
+    <p:extLst>
+      <p:ext uri="{BB962C8B-B14F-4D97-AF65-F5344CB8AC3E}">
+        <p14:creationId xmlns:p14="http://schemas.microsoft.com/office/powerpoint/2010/main" val="2184144916"/>
+      </p:ext>
+    </p:extLst>
+  </p:cSld>
+  <p:clrMapOvr>
+    <a:masterClrMapping/>
+  </p:clrMapOvr>
+</p:sld>
+</file>
+
+<file path=ppt/slides/slide13.xml><?xml version="1.0" encoding="utf-8"?>
+<p:sld xmlns:a="http://schemas.openxmlformats.org/drawingml/2006/main" xmlns:r="http://schemas.openxmlformats.org/officeDocument/2006/relationships" xmlns:p="http://schemas.openxmlformats.org/presentationml/2006/main">
+  <p:cSld>
+    <p:spTree>
+      <p:nvGrpSpPr>
+        <p:cNvPr id="1" name=""/>
+        <p:cNvGrpSpPr/>
+        <p:nvPr/>
+      </p:nvGrpSpPr>
+      <p:grpSpPr>
+        <a:xfrm>
+          <a:off x="0" y="0"/>
+          <a:ext cx="0" cy="0"/>
+          <a:chOff x="0" y="0"/>
+          <a:chExt cx="0" cy="0"/>
+        </a:xfrm>
+      </p:grpSpPr>
+      <p:sp>
+        <p:nvSpPr>
           <p:cNvPr id="2" name="Title 1"/>
           <p:cNvSpPr>
             <a:spLocks noGrp="1"/>
@@ -3431,154 +3535,6 @@
 </p:sld>
 </file>
 
-<file path=ppt/slides/slide13.xml><?xml version="1.0" encoding="utf-8"?>
-<p:sld xmlns:a="http://schemas.openxmlformats.org/drawingml/2006/main" xmlns:r="http://schemas.openxmlformats.org/officeDocument/2006/relationships" xmlns:p="http://schemas.openxmlformats.org/presentationml/2006/main">
-  <p:cSld>
-    <p:spTree>
-      <p:nvGrpSpPr>
-        <p:cNvPr id="1" name=""/>
-        <p:cNvGrpSpPr/>
-        <p:nvPr/>
-      </p:nvGrpSpPr>
-      <p:grpSpPr>
-        <a:xfrm>
-          <a:off x="0" y="0"/>
-          <a:ext cx="0" cy="0"/>
-          <a:chOff x="0" y="0"/>
-          <a:chExt cx="0" cy="0"/>
-        </a:xfrm>
-      </p:grpSpPr>
-      <p:sp>
-        <p:nvSpPr>
-          <p:cNvPr id="2" name="Title 1"/>
-          <p:cNvSpPr>
-            <a:spLocks noGrp="1"/>
-          </p:cNvSpPr>
-          <p:nvPr>
-            <p:ph type="title"/>
-          </p:nvPr>
-        </p:nvSpPr>
-        <p:spPr/>
-        <p:txBody>
-          <a:bodyPr/>
-          <a:lstStyle/>
-          <a:p>
-            <a:r>
-              <a:rPr lang="en-US"/>
-              <a:t>AWS Predictive maintenance architecture</a:t>
-            </a:r>
-          </a:p>
-        </p:txBody>
-      </p:sp>
-      <p:sp>
-        <p:nvSpPr>
-          <p:cNvPr id="3" name="Content Placeholder 2"/>
-          <p:cNvSpPr>
-            <a:spLocks noGrp="1"/>
-          </p:cNvSpPr>
-          <p:nvPr>
-            <p:ph idx="1"/>
-          </p:nvPr>
-        </p:nvSpPr>
-        <p:spPr/>
-        <p:txBody>
-          <a:bodyPr>
-            <a:normAutofit fontScale="92500" lnSpcReduction="20000"/>
-          </a:bodyPr>
-          <a:lstStyle/>
-          <a:p>
-            <a:r>
-              <a:rPr lang="en-US"/>
-              <a:t>This solution includes an </a:t>
-            </a:r>
-            <a:r>
-              <a:rPr lang="en-US">
-                <a:hlinkClick r:id="rId2"/>
-              </a:rPr>
-              <a:t>AWS CloudFormation</a:t>
-            </a:r>
-            <a:r>
-              <a:rPr lang="en-US"/>
-              <a:t> template that deploys an example dataset of a </a:t>
-            </a:r>
-            <a:r>
-              <a:rPr lang="en-US">
-                <a:hlinkClick r:id="rId3"/>
-              </a:rPr>
-              <a:t>turbofan degradation simulation</a:t>
-            </a:r>
-            <a:r>
-              <a:rPr lang="en-US"/>
-              <a:t> contained in an </a:t>
-            </a:r>
-            <a:r>
-              <a:rPr lang="en-US">
-                <a:hlinkClick r:id="rId4"/>
-              </a:rPr>
-              <a:t>Amazon Simple Storage Service</a:t>
-            </a:r>
-            <a:r>
-              <a:rPr lang="en-US"/>
-              <a:t> (Amazon S3) bucket and an </a:t>
-            </a:r>
-            <a:r>
-              <a:rPr lang="en-US">
-                <a:hlinkClick r:id="rId5"/>
-              </a:rPr>
-              <a:t>Amazon SageMaker</a:t>
-            </a:r>
-            <a:r>
-              <a:rPr lang="en-US"/>
-              <a:t> endpoint with an ML model that will be trained on the dataset to predict remaining useful life (RUL).</a:t>
-            </a:r>
-          </a:p>
-          <a:p>
-            <a:r>
-              <a:rPr lang="en-US"/>
-              <a:t>The solution uses a SageMaker notebook instance to orchestrate the model, and a SageMaker training instance to perform the training. The training code and trained model are stored in the solution's Amazon S3 bucket.</a:t>
-            </a:r>
-          </a:p>
-          <a:p>
-            <a:r>
-              <a:rPr lang="en-US"/>
-              <a:t>The solution also deploys an </a:t>
-            </a:r>
-            <a:r>
-              <a:rPr lang="en-US">
-                <a:hlinkClick r:id="rId6"/>
-              </a:rPr>
-              <a:t>Amazon CloudWatch Events</a:t>
-            </a:r>
-            <a:r>
-              <a:rPr lang="en-US"/>
-              <a:t> rule that is configured to run once per day. The rule is configured to trigger an </a:t>
-            </a:r>
-            <a:r>
-              <a:rPr lang="en-US">
-                <a:hlinkClick r:id="rId7"/>
-              </a:rPr>
-              <a:t>AWS Lambda</a:t>
-            </a:r>
-            <a:r>
-              <a:rPr lang="en-US"/>
-              <a:t> function that creates an Amazon SageMaker batch transform job that uses the trained model to predict RUL from the example dataset.</a:t>
-            </a:r>
-          </a:p>
-        </p:txBody>
-      </p:sp>
-    </p:spTree>
-    <p:extLst>
-      <p:ext uri="{BB962C8B-B14F-4D97-AF65-F5344CB8AC3E}">
-        <p14:creationId xmlns:p14="http://schemas.microsoft.com/office/powerpoint/2010/main" val="2322710326"/>
-      </p:ext>
-    </p:extLst>
-  </p:cSld>
-  <p:clrMapOvr>
-    <a:masterClrMapping/>
-  </p:clrMapOvr>
-</p:sld>
-</file>
-
 <file path=ppt/slides/slide14.xml><?xml version="1.0" encoding="utf-8"?>
 <p:sld xmlns:a="http://schemas.openxmlformats.org/drawingml/2006/main" xmlns:r="http://schemas.openxmlformats.org/officeDocument/2006/relationships" xmlns:p="http://schemas.openxmlformats.org/presentationml/2006/main">
   <p:cSld>
@@ -3612,6 +3568,154 @@
           <a:lstStyle/>
           <a:p>
             <a:r>
+              <a:rPr lang="en-US"/>
+              <a:t>AWS Predictive maintenance architecture</a:t>
+            </a:r>
+          </a:p>
+        </p:txBody>
+      </p:sp>
+      <p:sp>
+        <p:nvSpPr>
+          <p:cNvPr id="3" name="Content Placeholder 2"/>
+          <p:cNvSpPr>
+            <a:spLocks noGrp="1"/>
+          </p:cNvSpPr>
+          <p:nvPr>
+            <p:ph idx="1"/>
+          </p:nvPr>
+        </p:nvSpPr>
+        <p:spPr/>
+        <p:txBody>
+          <a:bodyPr>
+            <a:normAutofit fontScale="92500" lnSpcReduction="20000"/>
+          </a:bodyPr>
+          <a:lstStyle/>
+          <a:p>
+            <a:r>
+              <a:rPr lang="en-US"/>
+              <a:t>This solution includes an </a:t>
+            </a:r>
+            <a:r>
+              <a:rPr lang="en-US">
+                <a:hlinkClick r:id="rId2"/>
+              </a:rPr>
+              <a:t>AWS CloudFormation</a:t>
+            </a:r>
+            <a:r>
+              <a:rPr lang="en-US"/>
+              <a:t> template that deploys an example dataset of a </a:t>
+            </a:r>
+            <a:r>
+              <a:rPr lang="en-US">
+                <a:hlinkClick r:id="rId3"/>
+              </a:rPr>
+              <a:t>turbofan degradation simulation</a:t>
+            </a:r>
+            <a:r>
+              <a:rPr lang="en-US"/>
+              <a:t> contained in an </a:t>
+            </a:r>
+            <a:r>
+              <a:rPr lang="en-US">
+                <a:hlinkClick r:id="rId4"/>
+              </a:rPr>
+              <a:t>Amazon Simple Storage Service</a:t>
+            </a:r>
+            <a:r>
+              <a:rPr lang="en-US"/>
+              <a:t> (Amazon S3) bucket and an </a:t>
+            </a:r>
+            <a:r>
+              <a:rPr lang="en-US">
+                <a:hlinkClick r:id="rId5"/>
+              </a:rPr>
+              <a:t>Amazon SageMaker</a:t>
+            </a:r>
+            <a:r>
+              <a:rPr lang="en-US"/>
+              <a:t> endpoint with an ML model that will be trained on the dataset to predict remaining useful life (RUL).</a:t>
+            </a:r>
+          </a:p>
+          <a:p>
+            <a:r>
+              <a:rPr lang="en-US"/>
+              <a:t>The solution uses a SageMaker notebook instance to orchestrate the model, and a SageMaker training instance to perform the training. The training code and trained model are stored in the solution's Amazon S3 bucket.</a:t>
+            </a:r>
+          </a:p>
+          <a:p>
+            <a:r>
+              <a:rPr lang="en-US"/>
+              <a:t>The solution also deploys an </a:t>
+            </a:r>
+            <a:r>
+              <a:rPr lang="en-US">
+                <a:hlinkClick r:id="rId6"/>
+              </a:rPr>
+              <a:t>Amazon CloudWatch Events</a:t>
+            </a:r>
+            <a:r>
+              <a:rPr lang="en-US"/>
+              <a:t> rule that is configured to run once per day. The rule is configured to trigger an </a:t>
+            </a:r>
+            <a:r>
+              <a:rPr lang="en-US">
+                <a:hlinkClick r:id="rId7"/>
+              </a:rPr>
+              <a:t>AWS Lambda</a:t>
+            </a:r>
+            <a:r>
+              <a:rPr lang="en-US"/>
+              <a:t> function that creates an Amazon SageMaker batch transform job that uses the trained model to predict RUL from the example dataset.</a:t>
+            </a:r>
+          </a:p>
+        </p:txBody>
+      </p:sp>
+    </p:spTree>
+    <p:extLst>
+      <p:ext uri="{BB962C8B-B14F-4D97-AF65-F5344CB8AC3E}">
+        <p14:creationId xmlns:p14="http://schemas.microsoft.com/office/powerpoint/2010/main" val="2322710326"/>
+      </p:ext>
+    </p:extLst>
+  </p:cSld>
+  <p:clrMapOvr>
+    <a:masterClrMapping/>
+  </p:clrMapOvr>
+</p:sld>
+</file>
+
+<file path=ppt/slides/slide15.xml><?xml version="1.0" encoding="utf-8"?>
+<p:sld xmlns:a="http://schemas.openxmlformats.org/drawingml/2006/main" xmlns:r="http://schemas.openxmlformats.org/officeDocument/2006/relationships" xmlns:p="http://schemas.openxmlformats.org/presentationml/2006/main">
+  <p:cSld>
+    <p:spTree>
+      <p:nvGrpSpPr>
+        <p:cNvPr id="1" name=""/>
+        <p:cNvGrpSpPr/>
+        <p:nvPr/>
+      </p:nvGrpSpPr>
+      <p:grpSpPr>
+        <a:xfrm>
+          <a:off x="0" y="0"/>
+          <a:ext cx="0" cy="0"/>
+          <a:chOff x="0" y="0"/>
+          <a:chExt cx="0" cy="0"/>
+        </a:xfrm>
+      </p:grpSpPr>
+      <p:sp>
+        <p:nvSpPr>
+          <p:cNvPr id="2" name="Title 1"/>
+          <p:cNvSpPr>
+            <a:spLocks noGrp="1"/>
+          </p:cNvSpPr>
+          <p:nvPr>
+            <p:ph type="title"/>
+          </p:nvPr>
+        </p:nvSpPr>
+        <p:spPr/>
+        <p:txBody>
+          <a:bodyPr/>
+          <a:lstStyle/>
+          <a:p>
+            <a:r>
               <a:rPr lang="en-US" smtClean="0"/>
               <a:t>Steps to deploy </a:t>
             </a:r>
@@ -3735,6 +3839,493 @@
     <p:extLst>
       <p:ext uri="{BB962C8B-B14F-4D97-AF65-F5344CB8AC3E}">
         <p14:creationId xmlns:p14="http://schemas.microsoft.com/office/powerpoint/2010/main" val="3570463678"/>
+      </p:ext>
+    </p:extLst>
+  </p:cSld>
+  <p:clrMapOvr>
+    <a:masterClrMapping/>
+  </p:clrMapOvr>
+</p:sld>
+</file>
+
+<file path=ppt/slides/slide16.xml><?xml version="1.0" encoding="utf-8"?>
+<p:sld xmlns:a="http://schemas.openxmlformats.org/drawingml/2006/main" xmlns:r="http://schemas.openxmlformats.org/officeDocument/2006/relationships" xmlns:p="http://schemas.openxmlformats.org/presentationml/2006/main">
+  <p:cSld>
+    <p:spTree>
+      <p:nvGrpSpPr>
+        <p:cNvPr id="1" name=""/>
+        <p:cNvGrpSpPr/>
+        <p:nvPr/>
+      </p:nvGrpSpPr>
+      <p:grpSpPr>
+        <a:xfrm>
+          <a:off x="0" y="0"/>
+          <a:ext cx="0" cy="0"/>
+          <a:chOff x="0" y="0"/>
+          <a:chExt cx="0" cy="0"/>
+        </a:xfrm>
+      </p:grpSpPr>
+      <p:sp>
+        <p:nvSpPr>
+          <p:cNvPr id="2" name="Title 1"/>
+          <p:cNvSpPr>
+            <a:spLocks noGrp="1"/>
+          </p:cNvSpPr>
+          <p:nvPr>
+            <p:ph type="title"/>
+          </p:nvPr>
+        </p:nvSpPr>
+        <p:spPr/>
+        <p:txBody>
+          <a:bodyPr/>
+          <a:lstStyle/>
+          <a:p>
+            <a:r>
+              <a:rPr lang="en-US" smtClean="0"/>
+              <a:t>Turbofan architecture</a:t>
+            </a:r>
+            <a:endParaRPr lang="en-US"/>
+          </a:p>
+        </p:txBody>
+      </p:sp>
+      <p:pic>
+        <p:nvPicPr>
+          <p:cNvPr id="4" name="Picture 3"/>
+          <p:cNvPicPr>
+            <a:picLocks noChangeAspect="1"/>
+          </p:cNvPicPr>
+          <p:nvPr/>
+        </p:nvPicPr>
+        <p:blipFill>
+          <a:blip r:embed="rId2"/>
+          <a:stretch>
+            <a:fillRect/>
+          </a:stretch>
+        </p:blipFill>
+        <p:spPr>
+          <a:xfrm>
+            <a:off x="591650" y="2029074"/>
+            <a:ext cx="5504350" cy="4509838"/>
+          </a:xfrm>
+          <a:prstGeom prst="rect">
+            <a:avLst/>
+          </a:prstGeom>
+        </p:spPr>
+      </p:pic>
+      <p:pic>
+        <p:nvPicPr>
+          <p:cNvPr id="5" name="Picture 4"/>
+          <p:cNvPicPr>
+            <a:picLocks noChangeAspect="1"/>
+          </p:cNvPicPr>
+          <p:nvPr/>
+        </p:nvPicPr>
+        <p:blipFill>
+          <a:blip r:embed="rId3"/>
+          <a:stretch>
+            <a:fillRect/>
+          </a:stretch>
+        </p:blipFill>
+        <p:spPr>
+          <a:xfrm>
+            <a:off x="6315075" y="2200641"/>
+            <a:ext cx="5038725" cy="3248025"/>
+          </a:xfrm>
+          <a:prstGeom prst="rect">
+            <a:avLst/>
+          </a:prstGeom>
+        </p:spPr>
+      </p:pic>
+    </p:spTree>
+    <p:extLst>
+      <p:ext uri="{BB962C8B-B14F-4D97-AF65-F5344CB8AC3E}">
+        <p14:creationId xmlns:p14="http://schemas.microsoft.com/office/powerpoint/2010/main" val="682639420"/>
+      </p:ext>
+    </p:extLst>
+  </p:cSld>
+  <p:clrMapOvr>
+    <a:masterClrMapping/>
+  </p:clrMapOvr>
+</p:sld>
+</file>
+
+<file path=ppt/slides/slide17.xml><?xml version="1.0" encoding="utf-8"?>
+<p:sld xmlns:a="http://schemas.openxmlformats.org/drawingml/2006/main" xmlns:r="http://schemas.openxmlformats.org/officeDocument/2006/relationships" xmlns:p="http://schemas.openxmlformats.org/presentationml/2006/main">
+  <p:cSld>
+    <p:spTree>
+      <p:nvGrpSpPr>
+        <p:cNvPr id="1" name=""/>
+        <p:cNvGrpSpPr/>
+        <p:nvPr/>
+      </p:nvGrpSpPr>
+      <p:grpSpPr>
+        <a:xfrm>
+          <a:off x="0" y="0"/>
+          <a:ext cx="0" cy="0"/>
+          <a:chOff x="0" y="0"/>
+          <a:chExt cx="0" cy="0"/>
+        </a:xfrm>
+      </p:grpSpPr>
+      <p:sp>
+        <p:nvSpPr>
+          <p:cNvPr id="2" name="Title 1"/>
+          <p:cNvSpPr>
+            <a:spLocks noGrp="1"/>
+          </p:cNvSpPr>
+          <p:nvPr>
+            <p:ph type="title"/>
+          </p:nvPr>
+        </p:nvSpPr>
+        <p:spPr/>
+        <p:txBody>
+          <a:bodyPr/>
+          <a:lstStyle/>
+          <a:p>
+            <a:r>
+              <a:rPr lang="en-US" smtClean="0"/>
+              <a:t>Measurement sensor</a:t>
+            </a:r>
+            <a:endParaRPr lang="en-US"/>
+          </a:p>
+        </p:txBody>
+      </p:sp>
+      <p:pic>
+        <p:nvPicPr>
+          <p:cNvPr id="4" name="Picture 3"/>
+          <p:cNvPicPr>
+            <a:picLocks noChangeAspect="1"/>
+          </p:cNvPicPr>
+          <p:nvPr/>
+        </p:nvPicPr>
+        <p:blipFill>
+          <a:blip r:embed="rId2"/>
+          <a:stretch>
+            <a:fillRect/>
+          </a:stretch>
+        </p:blipFill>
+        <p:spPr>
+          <a:xfrm>
+            <a:off x="949569" y="1814732"/>
+            <a:ext cx="5077558" cy="4700368"/>
+          </a:xfrm>
+          <a:prstGeom prst="rect">
+            <a:avLst/>
+          </a:prstGeom>
+        </p:spPr>
+      </p:pic>
+      <p:pic>
+        <p:nvPicPr>
+          <p:cNvPr id="5" name="Picture 4"/>
+          <p:cNvPicPr>
+            <a:picLocks noChangeAspect="1"/>
+          </p:cNvPicPr>
+          <p:nvPr/>
+        </p:nvPicPr>
+        <p:blipFill>
+          <a:blip r:embed="rId3"/>
+          <a:stretch>
+            <a:fillRect/>
+          </a:stretch>
+        </p:blipFill>
+        <p:spPr>
+          <a:xfrm>
+            <a:off x="6565289" y="1975624"/>
+            <a:ext cx="5207611" cy="1274892"/>
+          </a:xfrm>
+          <a:prstGeom prst="rect">
+            <a:avLst/>
+          </a:prstGeom>
+        </p:spPr>
+      </p:pic>
+    </p:spTree>
+    <p:extLst>
+      <p:ext uri="{BB962C8B-B14F-4D97-AF65-F5344CB8AC3E}">
+        <p14:creationId xmlns:p14="http://schemas.microsoft.com/office/powerpoint/2010/main" val="1857905192"/>
+      </p:ext>
+    </p:extLst>
+  </p:cSld>
+  <p:clrMapOvr>
+    <a:masterClrMapping/>
+  </p:clrMapOvr>
+</p:sld>
+</file>
+
+<file path=ppt/slides/slide18.xml><?xml version="1.0" encoding="utf-8"?>
+<p:sld xmlns:a="http://schemas.openxmlformats.org/drawingml/2006/main" xmlns:r="http://schemas.openxmlformats.org/officeDocument/2006/relationships" xmlns:p="http://schemas.openxmlformats.org/presentationml/2006/main">
+  <p:cSld>
+    <p:spTree>
+      <p:nvGrpSpPr>
+        <p:cNvPr id="1" name=""/>
+        <p:cNvGrpSpPr/>
+        <p:nvPr/>
+      </p:nvGrpSpPr>
+      <p:grpSpPr>
+        <a:xfrm>
+          <a:off x="0" y="0"/>
+          <a:ext cx="0" cy="0"/>
+          <a:chOff x="0" y="0"/>
+          <a:chExt cx="0" cy="0"/>
+        </a:xfrm>
+      </p:grpSpPr>
+      <p:sp>
+        <p:nvSpPr>
+          <p:cNvPr id="2" name="Title 1"/>
+          <p:cNvSpPr>
+            <a:spLocks noGrp="1"/>
+          </p:cNvSpPr>
+          <p:nvPr>
+            <p:ph type="title"/>
+          </p:nvPr>
+        </p:nvSpPr>
+        <p:spPr/>
+        <p:txBody>
+          <a:bodyPr/>
+          <a:lstStyle/>
+          <a:p>
+            <a:r>
+              <a:rPr lang="en-US" smtClean="0"/>
+              <a:t>Data set</a:t>
+            </a:r>
+            <a:endParaRPr lang="en-US"/>
+          </a:p>
+        </p:txBody>
+      </p:sp>
+      <p:pic>
+        <p:nvPicPr>
+          <p:cNvPr id="4" name="Picture 3"/>
+          <p:cNvPicPr>
+            <a:picLocks noChangeAspect="1"/>
+          </p:cNvPicPr>
+          <p:nvPr/>
+        </p:nvPicPr>
+        <p:blipFill>
+          <a:blip r:embed="rId2"/>
+          <a:stretch>
+            <a:fillRect/>
+          </a:stretch>
+        </p:blipFill>
+        <p:spPr>
+          <a:xfrm>
+            <a:off x="518747" y="2225393"/>
+            <a:ext cx="11596687" cy="3832873"/>
+          </a:xfrm>
+          <a:prstGeom prst="rect">
+            <a:avLst/>
+          </a:prstGeom>
+        </p:spPr>
+      </p:pic>
+    </p:spTree>
+    <p:extLst>
+      <p:ext uri="{BB962C8B-B14F-4D97-AF65-F5344CB8AC3E}">
+        <p14:creationId xmlns:p14="http://schemas.microsoft.com/office/powerpoint/2010/main" val="2750307966"/>
+      </p:ext>
+    </p:extLst>
+  </p:cSld>
+  <p:clrMapOvr>
+    <a:masterClrMapping/>
+  </p:clrMapOvr>
+</p:sld>
+</file>
+
+<file path=ppt/slides/slide19.xml><?xml version="1.0" encoding="utf-8"?>
+<p:sld xmlns:a="http://schemas.openxmlformats.org/drawingml/2006/main" xmlns:r="http://schemas.openxmlformats.org/officeDocument/2006/relationships" xmlns:p="http://schemas.openxmlformats.org/presentationml/2006/main">
+  <p:cSld>
+    <p:spTree>
+      <p:nvGrpSpPr>
+        <p:cNvPr id="1" name=""/>
+        <p:cNvGrpSpPr/>
+        <p:nvPr/>
+      </p:nvGrpSpPr>
+      <p:grpSpPr>
+        <a:xfrm>
+          <a:off x="0" y="0"/>
+          <a:ext cx="0" cy="0"/>
+          <a:chOff x="0" y="0"/>
+          <a:chExt cx="0" cy="0"/>
+        </a:xfrm>
+      </p:grpSpPr>
+      <p:sp>
+        <p:nvSpPr>
+          <p:cNvPr id="2" name="Title 1"/>
+          <p:cNvSpPr>
+            <a:spLocks noGrp="1"/>
+          </p:cNvSpPr>
+          <p:nvPr>
+            <p:ph type="title"/>
+          </p:nvPr>
+        </p:nvSpPr>
+        <p:spPr/>
+        <p:txBody>
+          <a:bodyPr/>
+          <a:lstStyle/>
+          <a:p>
+            <a:r>
+              <a:rPr lang="en-US"/>
+              <a:t>Prepare train data</a:t>
+            </a:r>
+          </a:p>
+        </p:txBody>
+      </p:sp>
+      <p:pic>
+        <p:nvPicPr>
+          <p:cNvPr id="4" name="Picture 3"/>
+          <p:cNvPicPr>
+            <a:picLocks noChangeAspect="1"/>
+          </p:cNvPicPr>
+          <p:nvPr/>
+        </p:nvPicPr>
+        <p:blipFill>
+          <a:blip r:embed="rId2"/>
+          <a:stretch>
+            <a:fillRect/>
+          </a:stretch>
+        </p:blipFill>
+        <p:spPr>
+          <a:xfrm>
+            <a:off x="265235" y="2099456"/>
+            <a:ext cx="11926765" cy="2973339"/>
+          </a:xfrm>
+          <a:prstGeom prst="rect">
+            <a:avLst/>
+          </a:prstGeom>
+        </p:spPr>
+      </p:pic>
+      <p:sp>
+        <p:nvSpPr>
+          <p:cNvPr id="5" name="TextBox 4"/>
+          <p:cNvSpPr txBox="1"/>
+          <p:nvPr/>
+        </p:nvSpPr>
+        <p:spPr>
+          <a:xfrm>
+            <a:off x="2297669" y="5717177"/>
+            <a:ext cx="3930948" cy="646331"/>
+          </a:xfrm>
+          <a:prstGeom prst="rect">
+            <a:avLst/>
+          </a:prstGeom>
+          <a:noFill/>
+        </p:spPr>
+        <p:txBody>
+          <a:bodyPr wrap="none" rtlCol="0">
+            <a:spAutoFit/>
+          </a:bodyPr>
+          <a:lstStyle/>
+          <a:p>
+            <a:r>
+              <a:rPr lang="en-US" smtClean="0"/>
+              <a:t>Engine setting </a:t>
+            </a:r>
+          </a:p>
+          <a:p>
+            <a:r>
+              <a:rPr lang="en-US" smtClean="0"/>
+              <a:t>(altitude, march, sea-level temperature)</a:t>
+            </a:r>
+            <a:endParaRPr lang="en-US"/>
+          </a:p>
+        </p:txBody>
+      </p:sp>
+      <p:sp>
+        <p:nvSpPr>
+          <p:cNvPr id="6" name="TextBox 5"/>
+          <p:cNvSpPr txBox="1"/>
+          <p:nvPr/>
+        </p:nvSpPr>
+        <p:spPr>
+          <a:xfrm>
+            <a:off x="7239000" y="5855677"/>
+            <a:ext cx="2183290" cy="369332"/>
+          </a:xfrm>
+          <a:prstGeom prst="rect">
+            <a:avLst/>
+          </a:prstGeom>
+          <a:noFill/>
+        </p:spPr>
+        <p:txBody>
+          <a:bodyPr wrap="none" rtlCol="0">
+            <a:spAutoFit/>
+          </a:bodyPr>
+          <a:lstStyle/>
+          <a:p>
+            <a:r>
+              <a:rPr lang="en-US" smtClean="0"/>
+              <a:t>Sensor measurement</a:t>
+            </a:r>
+            <a:endParaRPr lang="en-US"/>
+          </a:p>
+        </p:txBody>
+      </p:sp>
+      <p:cxnSp>
+        <p:nvCxnSpPr>
+          <p:cNvPr id="8" name="Straight Arrow Connector 7"/>
+          <p:cNvCxnSpPr/>
+          <p:nvPr/>
+        </p:nvCxnSpPr>
+        <p:spPr>
+          <a:xfrm flipV="1">
+            <a:off x="3253154" y="5134709"/>
+            <a:ext cx="1" cy="582468"/>
+          </a:xfrm>
+          <a:prstGeom prst="straightConnector1">
+            <a:avLst/>
+          </a:prstGeom>
+          <a:ln>
+            <a:tailEnd type="triangle"/>
+          </a:ln>
+        </p:spPr>
+        <p:style>
+          <a:lnRef idx="1">
+            <a:schemeClr val="accent1"/>
+          </a:lnRef>
+          <a:fillRef idx="0">
+            <a:schemeClr val="accent1"/>
+          </a:fillRef>
+          <a:effectRef idx="0">
+            <a:schemeClr val="accent1"/>
+          </a:effectRef>
+          <a:fontRef idx="minor">
+            <a:schemeClr val="tx1"/>
+          </a:fontRef>
+        </p:style>
+      </p:cxnSp>
+      <p:cxnSp>
+        <p:nvCxnSpPr>
+          <p:cNvPr id="10" name="Straight Arrow Connector 9"/>
+          <p:cNvCxnSpPr/>
+          <p:nvPr/>
+        </p:nvCxnSpPr>
+        <p:spPr>
+          <a:xfrm flipH="1" flipV="1">
+            <a:off x="8097715" y="5169694"/>
+            <a:ext cx="483577" cy="685983"/>
+          </a:xfrm>
+          <a:prstGeom prst="straightConnector1">
+            <a:avLst/>
+          </a:prstGeom>
+          <a:ln>
+            <a:tailEnd type="triangle"/>
+          </a:ln>
+        </p:spPr>
+        <p:style>
+          <a:lnRef idx="1">
+            <a:schemeClr val="accent1"/>
+          </a:lnRef>
+          <a:fillRef idx="0">
+            <a:schemeClr val="accent1"/>
+          </a:fillRef>
+          <a:effectRef idx="0">
+            <a:schemeClr val="accent1"/>
+          </a:effectRef>
+          <a:fontRef idx="minor">
+            <a:schemeClr val="tx1"/>
+          </a:fontRef>
+        </p:style>
+      </p:cxnSp>
+    </p:spTree>
+    <p:extLst>
+      <p:ext uri="{BB962C8B-B14F-4D97-AF65-F5344CB8AC3E}">
+        <p14:creationId xmlns:p14="http://schemas.microsoft.com/office/powerpoint/2010/main" val="1690943893"/>
       </p:ext>
     </p:extLst>
   </p:cSld>
@@ -3899,6 +4490,454 @@
     <p:extLst>
       <p:ext uri="{BB962C8B-B14F-4D97-AF65-F5344CB8AC3E}">
         <p14:creationId xmlns:p14="http://schemas.microsoft.com/office/powerpoint/2010/main" val="547988742"/>
+      </p:ext>
+    </p:extLst>
+  </p:cSld>
+  <p:clrMapOvr>
+    <a:masterClrMapping/>
+  </p:clrMapOvr>
+</p:sld>
+</file>
+
+<file path=ppt/slides/slide20.xml><?xml version="1.0" encoding="utf-8"?>
+<p:sld xmlns:a="http://schemas.openxmlformats.org/drawingml/2006/main" xmlns:r="http://schemas.openxmlformats.org/officeDocument/2006/relationships" xmlns:p="http://schemas.openxmlformats.org/presentationml/2006/main">
+  <p:cSld>
+    <p:spTree>
+      <p:nvGrpSpPr>
+        <p:cNvPr id="1" name=""/>
+        <p:cNvGrpSpPr/>
+        <p:nvPr/>
+      </p:nvGrpSpPr>
+      <p:grpSpPr>
+        <a:xfrm>
+          <a:off x="0" y="0"/>
+          <a:ext cx="0" cy="0"/>
+          <a:chOff x="0" y="0"/>
+          <a:chExt cx="0" cy="0"/>
+        </a:xfrm>
+      </p:grpSpPr>
+      <p:sp>
+        <p:nvSpPr>
+          <p:cNvPr id="2" name="Title 1"/>
+          <p:cNvSpPr>
+            <a:spLocks noGrp="1"/>
+          </p:cNvSpPr>
+          <p:nvPr>
+            <p:ph type="title"/>
+          </p:nvPr>
+        </p:nvSpPr>
+        <p:spPr/>
+        <p:txBody>
+          <a:bodyPr/>
+          <a:lstStyle/>
+          <a:p>
+            <a:r>
+              <a:rPr lang="en-US" smtClean="0"/>
+              <a:t>Prepare train data</a:t>
+            </a:r>
+            <a:endParaRPr lang="en-US"/>
+          </a:p>
+        </p:txBody>
+      </p:sp>
+      <p:pic>
+        <p:nvPicPr>
+          <p:cNvPr id="4" name="Picture 3"/>
+          <p:cNvPicPr>
+            <a:picLocks noChangeAspect="1"/>
+          </p:cNvPicPr>
+          <p:nvPr/>
+        </p:nvPicPr>
+        <p:blipFill>
+          <a:blip r:embed="rId2"/>
+          <a:stretch>
+            <a:fillRect/>
+          </a:stretch>
+        </p:blipFill>
+        <p:spPr>
+          <a:xfrm>
+            <a:off x="19050" y="1690688"/>
+            <a:ext cx="12153900" cy="4295775"/>
+          </a:xfrm>
+          <a:prstGeom prst="rect">
+            <a:avLst/>
+          </a:prstGeom>
+        </p:spPr>
+      </p:pic>
+    </p:spTree>
+    <p:extLst>
+      <p:ext uri="{BB962C8B-B14F-4D97-AF65-F5344CB8AC3E}">
+        <p14:creationId xmlns:p14="http://schemas.microsoft.com/office/powerpoint/2010/main" val="468710246"/>
+      </p:ext>
+    </p:extLst>
+  </p:cSld>
+  <p:clrMapOvr>
+    <a:masterClrMapping/>
+  </p:clrMapOvr>
+</p:sld>
+</file>
+
+<file path=ppt/slides/slide21.xml><?xml version="1.0" encoding="utf-8"?>
+<p:sld xmlns:a="http://schemas.openxmlformats.org/drawingml/2006/main" xmlns:r="http://schemas.openxmlformats.org/officeDocument/2006/relationships" xmlns:p="http://schemas.openxmlformats.org/presentationml/2006/main">
+  <p:cSld>
+    <p:spTree>
+      <p:nvGrpSpPr>
+        <p:cNvPr id="1" name=""/>
+        <p:cNvGrpSpPr/>
+        <p:nvPr/>
+      </p:nvGrpSpPr>
+      <p:grpSpPr>
+        <a:xfrm>
+          <a:off x="0" y="0"/>
+          <a:ext cx="0" cy="0"/>
+          <a:chOff x="0" y="0"/>
+          <a:chExt cx="0" cy="0"/>
+        </a:xfrm>
+      </p:grpSpPr>
+      <p:sp>
+        <p:nvSpPr>
+          <p:cNvPr id="2" name="Title 1"/>
+          <p:cNvSpPr>
+            <a:spLocks noGrp="1"/>
+          </p:cNvSpPr>
+          <p:nvPr>
+            <p:ph type="title"/>
+          </p:nvPr>
+        </p:nvSpPr>
+        <p:spPr/>
+        <p:txBody>
+          <a:bodyPr/>
+          <a:lstStyle/>
+          <a:p>
+            <a:r>
+              <a:rPr lang="en-US" smtClean="0"/>
+              <a:t>Create model and train</a:t>
+            </a:r>
+            <a:endParaRPr lang="en-US"/>
+          </a:p>
+        </p:txBody>
+      </p:sp>
+      <p:pic>
+        <p:nvPicPr>
+          <p:cNvPr id="4" name="Picture 3"/>
+          <p:cNvPicPr>
+            <a:picLocks noChangeAspect="1"/>
+          </p:cNvPicPr>
+          <p:nvPr/>
+        </p:nvPicPr>
+        <p:blipFill>
+          <a:blip r:embed="rId2"/>
+          <a:stretch>
+            <a:fillRect/>
+          </a:stretch>
+        </p:blipFill>
+        <p:spPr>
+          <a:xfrm>
+            <a:off x="764931" y="1690688"/>
+            <a:ext cx="11017127" cy="4936809"/>
+          </a:xfrm>
+          <a:prstGeom prst="rect">
+            <a:avLst/>
+          </a:prstGeom>
+        </p:spPr>
+      </p:pic>
+    </p:spTree>
+    <p:extLst>
+      <p:ext uri="{BB962C8B-B14F-4D97-AF65-F5344CB8AC3E}">
+        <p14:creationId xmlns:p14="http://schemas.microsoft.com/office/powerpoint/2010/main" val="3152476639"/>
+      </p:ext>
+    </p:extLst>
+  </p:cSld>
+  <p:clrMapOvr>
+    <a:masterClrMapping/>
+  </p:clrMapOvr>
+</p:sld>
+</file>
+
+<file path=ppt/slides/slide22.xml><?xml version="1.0" encoding="utf-8"?>
+<p:sld xmlns:a="http://schemas.openxmlformats.org/drawingml/2006/main" xmlns:r="http://schemas.openxmlformats.org/officeDocument/2006/relationships" xmlns:p="http://schemas.openxmlformats.org/presentationml/2006/main">
+  <p:cSld>
+    <p:spTree>
+      <p:nvGrpSpPr>
+        <p:cNvPr id="1" name=""/>
+        <p:cNvGrpSpPr/>
+        <p:nvPr/>
+      </p:nvGrpSpPr>
+      <p:grpSpPr>
+        <a:xfrm>
+          <a:off x="0" y="0"/>
+          <a:ext cx="0" cy="0"/>
+          <a:chOff x="0" y="0"/>
+          <a:chExt cx="0" cy="0"/>
+        </a:xfrm>
+      </p:grpSpPr>
+      <p:sp>
+        <p:nvSpPr>
+          <p:cNvPr id="2" name="Title 1"/>
+          <p:cNvSpPr>
+            <a:spLocks noGrp="1"/>
+          </p:cNvSpPr>
+          <p:nvPr>
+            <p:ph type="title"/>
+          </p:nvPr>
+        </p:nvSpPr>
+        <p:spPr/>
+        <p:txBody>
+          <a:bodyPr/>
+          <a:lstStyle/>
+          <a:p>
+            <a:r>
+              <a:rPr lang="en-US" smtClean="0"/>
+              <a:t>Transform test data </a:t>
+            </a:r>
+            <a:endParaRPr lang="en-US"/>
+          </a:p>
+        </p:txBody>
+      </p:sp>
+      <p:pic>
+        <p:nvPicPr>
+          <p:cNvPr id="4" name="Content Placeholder 3"/>
+          <p:cNvPicPr>
+            <a:picLocks noGrp="1" noChangeAspect="1"/>
+          </p:cNvPicPr>
+          <p:nvPr>
+            <p:ph idx="1"/>
+          </p:nvPr>
+        </p:nvPicPr>
+        <p:blipFill>
+          <a:blip r:embed="rId2"/>
+          <a:stretch>
+            <a:fillRect/>
+          </a:stretch>
+        </p:blipFill>
+        <p:spPr>
+          <a:xfrm>
+            <a:off x="838200" y="1986306"/>
+            <a:ext cx="10515600" cy="4029975"/>
+          </a:xfrm>
+          <a:prstGeom prst="rect">
+            <a:avLst/>
+          </a:prstGeom>
+        </p:spPr>
+      </p:pic>
+    </p:spTree>
+    <p:extLst>
+      <p:ext uri="{BB962C8B-B14F-4D97-AF65-F5344CB8AC3E}">
+        <p14:creationId xmlns:p14="http://schemas.microsoft.com/office/powerpoint/2010/main" val="3733946999"/>
+      </p:ext>
+    </p:extLst>
+  </p:cSld>
+  <p:clrMapOvr>
+    <a:masterClrMapping/>
+  </p:clrMapOvr>
+</p:sld>
+</file>
+
+<file path=ppt/slides/slide23.xml><?xml version="1.0" encoding="utf-8"?>
+<p:sld xmlns:a="http://schemas.openxmlformats.org/drawingml/2006/main" xmlns:r="http://schemas.openxmlformats.org/officeDocument/2006/relationships" xmlns:p="http://schemas.openxmlformats.org/presentationml/2006/main">
+  <p:cSld>
+    <p:spTree>
+      <p:nvGrpSpPr>
+        <p:cNvPr id="1" name=""/>
+        <p:cNvGrpSpPr/>
+        <p:nvPr/>
+      </p:nvGrpSpPr>
+      <p:grpSpPr>
+        <a:xfrm>
+          <a:off x="0" y="0"/>
+          <a:ext cx="0" cy="0"/>
+          <a:chOff x="0" y="0"/>
+          <a:chExt cx="0" cy="0"/>
+        </a:xfrm>
+      </p:grpSpPr>
+      <p:sp>
+        <p:nvSpPr>
+          <p:cNvPr id="2" name="Title 1"/>
+          <p:cNvSpPr>
+            <a:spLocks noGrp="1"/>
+          </p:cNvSpPr>
+          <p:nvPr>
+            <p:ph type="title"/>
+          </p:nvPr>
+        </p:nvSpPr>
+        <p:spPr/>
+        <p:txBody>
+          <a:bodyPr/>
+          <a:lstStyle/>
+          <a:p>
+            <a:r>
+              <a:rPr lang="en-US" smtClean="0"/>
+              <a:t>AWS SageMaker</a:t>
+            </a:r>
+            <a:endParaRPr lang="en-US"/>
+          </a:p>
+        </p:txBody>
+      </p:sp>
+      <p:sp>
+        <p:nvSpPr>
+          <p:cNvPr id="4" name="Text Placeholder 3"/>
+          <p:cNvSpPr>
+            <a:spLocks noGrp="1"/>
+          </p:cNvSpPr>
+          <p:nvPr>
+            <p:ph type="body" idx="1"/>
+          </p:nvPr>
+        </p:nvSpPr>
+        <p:spPr/>
+        <p:txBody>
+          <a:bodyPr/>
+          <a:lstStyle/>
+          <a:p>
+            <a:endParaRPr lang="en-US"/>
+          </a:p>
+        </p:txBody>
+      </p:sp>
+    </p:spTree>
+    <p:extLst>
+      <p:ext uri="{BB962C8B-B14F-4D97-AF65-F5344CB8AC3E}">
+        <p14:creationId xmlns:p14="http://schemas.microsoft.com/office/powerpoint/2010/main" val="2981711098"/>
+      </p:ext>
+    </p:extLst>
+  </p:cSld>
+  <p:clrMapOvr>
+    <a:masterClrMapping/>
+  </p:clrMapOvr>
+</p:sld>
+</file>
+
+<file path=ppt/slides/slide24.xml><?xml version="1.0" encoding="utf-8"?>
+<p:sld xmlns:a="http://schemas.openxmlformats.org/drawingml/2006/main" xmlns:r="http://schemas.openxmlformats.org/officeDocument/2006/relationships" xmlns:p="http://schemas.openxmlformats.org/presentationml/2006/main">
+  <p:cSld>
+    <p:spTree>
+      <p:nvGrpSpPr>
+        <p:cNvPr id="1" name=""/>
+        <p:cNvGrpSpPr/>
+        <p:nvPr/>
+      </p:nvGrpSpPr>
+      <p:grpSpPr>
+        <a:xfrm>
+          <a:off x="0" y="0"/>
+          <a:ext cx="0" cy="0"/>
+          <a:chOff x="0" y="0"/>
+          <a:chExt cx="0" cy="0"/>
+        </a:xfrm>
+      </p:grpSpPr>
+      <p:sp>
+        <p:nvSpPr>
+          <p:cNvPr id="4" name="Title 3"/>
+          <p:cNvSpPr>
+            <a:spLocks noGrp="1"/>
+          </p:cNvSpPr>
+          <p:nvPr>
+            <p:ph type="title"/>
+          </p:nvPr>
+        </p:nvSpPr>
+        <p:spPr/>
+        <p:txBody>
+          <a:bodyPr/>
+          <a:lstStyle/>
+          <a:p>
+            <a:r>
+              <a:rPr lang="en-US" smtClean="0"/>
+              <a:t>Steps to build, train, test a model</a:t>
+            </a:r>
+            <a:endParaRPr lang="en-US"/>
+          </a:p>
+        </p:txBody>
+      </p:sp>
+      <p:sp>
+        <p:nvSpPr>
+          <p:cNvPr id="5" name="Content Placeholder 4"/>
+          <p:cNvSpPr>
+            <a:spLocks noGrp="1"/>
+          </p:cNvSpPr>
+          <p:nvPr>
+            <p:ph idx="1"/>
+          </p:nvPr>
+        </p:nvSpPr>
+        <p:spPr/>
+        <p:txBody>
+          <a:bodyPr>
+            <a:normAutofit lnSpcReduction="10000"/>
+          </a:bodyPr>
+          <a:lstStyle/>
+          <a:p>
+            <a:r>
+              <a:rPr lang="en-US" smtClean="0"/>
+              <a:t>Create a notebook instance: name, instance type, IAM role</a:t>
+            </a:r>
+          </a:p>
+          <a:p>
+            <a:r>
+              <a:rPr lang="en-US" smtClean="0"/>
+              <a:t>Create a S3 bucket: boto3 client</a:t>
+            </a:r>
+          </a:p>
+          <a:p>
+            <a:r>
+              <a:rPr lang="en-US" smtClean="0"/>
+              <a:t>Download data as csv, put into data frame</a:t>
+            </a:r>
+          </a:p>
+          <a:p>
+            <a:r>
+              <a:rPr lang="en-US" smtClean="0"/>
+              <a:t>Spit train and test data</a:t>
+            </a:r>
+          </a:p>
+          <a:p>
+            <a:r>
+              <a:rPr lang="en-US" smtClean="0"/>
+              <a:t>Upload to S3: boto3 client</a:t>
+            </a:r>
+          </a:p>
+          <a:p>
+            <a:r>
+              <a:rPr lang="en-US" smtClean="0"/>
+              <a:t>Create input train data, create model, hyperparameters, train: sagemaker</a:t>
+            </a:r>
+          </a:p>
+          <a:p>
+            <a:r>
+              <a:rPr lang="en-US" smtClean="0"/>
+              <a:t>Deploy: instance </a:t>
+            </a:r>
+            <a:r>
+              <a:rPr lang="en-US"/>
+              <a:t>type </a:t>
+            </a:r>
+            <a:r>
+              <a:rPr lang="en-US"/>
+              <a:t>and </a:t>
+            </a:r>
+            <a:r>
+              <a:rPr lang="en-US" smtClean="0"/>
+              <a:t>endpoint </a:t>
+            </a:r>
+            <a:r>
+              <a:rPr lang="en-US" smtClean="0">
+                <a:sym typeface="Wingdings" panose="05000000000000000000" pitchFamily="2" charset="2"/>
+              </a:rPr>
+              <a:t> return predictor</a:t>
+            </a:r>
+          </a:p>
+          <a:p>
+            <a:r>
+              <a:rPr lang="en-US" smtClean="0">
+                <a:sym typeface="Wingdings" panose="05000000000000000000" pitchFamily="2" charset="2"/>
+              </a:rPr>
+              <a:t>Use predictor to infer </a:t>
+            </a:r>
+            <a:endParaRPr lang="en-US" smtClean="0"/>
+          </a:p>
+          <a:p>
+            <a:endParaRPr lang="en-US" smtClean="0"/>
+          </a:p>
+        </p:txBody>
+      </p:sp>
+    </p:spTree>
+    <p:extLst>
+      <p:ext uri="{BB962C8B-B14F-4D97-AF65-F5344CB8AC3E}">
+        <p14:creationId xmlns:p14="http://schemas.microsoft.com/office/powerpoint/2010/main" val="232256181"/>
       </p:ext>
     </p:extLst>
   </p:cSld>

</xml_diff>